<commit_message>
Remove "to do" slide
</commit_message>
<xml_diff>
--- a/Using Algorithms to Solve Hard Problems 2022-01-13.pptx
+++ b/Using Algorithms to Solve Hard Problems 2022-01-13.pptx
@@ -5,67 +5,66 @@
     <p:sldMasterId id="2147483660" r:id="rId1"/>
   </p:sldMasterIdLst>
   <p:notesMasterIdLst>
-    <p:notesMasterId r:id="rId60"/>
+    <p:notesMasterId r:id="rId59"/>
   </p:notesMasterIdLst>
   <p:sldIdLst>
     <p:sldId id="256" r:id="rId2"/>
     <p:sldId id="310" r:id="rId3"/>
-    <p:sldId id="257" r:id="rId4"/>
-    <p:sldId id="309" r:id="rId5"/>
-    <p:sldId id="303" r:id="rId6"/>
-    <p:sldId id="314" r:id="rId7"/>
-    <p:sldId id="312" r:id="rId8"/>
-    <p:sldId id="311" r:id="rId9"/>
-    <p:sldId id="261" r:id="rId10"/>
-    <p:sldId id="299" r:id="rId11"/>
-    <p:sldId id="258" r:id="rId12"/>
-    <p:sldId id="286" r:id="rId13"/>
-    <p:sldId id="287" r:id="rId14"/>
-    <p:sldId id="288" r:id="rId15"/>
-    <p:sldId id="289" r:id="rId16"/>
-    <p:sldId id="260" r:id="rId17"/>
-    <p:sldId id="259" r:id="rId18"/>
-    <p:sldId id="292" r:id="rId19"/>
-    <p:sldId id="305" r:id="rId20"/>
-    <p:sldId id="262" r:id="rId21"/>
-    <p:sldId id="263" r:id="rId22"/>
-    <p:sldId id="306" r:id="rId23"/>
-    <p:sldId id="264" r:id="rId24"/>
-    <p:sldId id="265" r:id="rId25"/>
-    <p:sldId id="266" r:id="rId26"/>
-    <p:sldId id="267" r:id="rId27"/>
-    <p:sldId id="268" r:id="rId28"/>
-    <p:sldId id="269" r:id="rId29"/>
-    <p:sldId id="270" r:id="rId30"/>
-    <p:sldId id="271" r:id="rId31"/>
-    <p:sldId id="285" r:id="rId32"/>
-    <p:sldId id="294" r:id="rId33"/>
-    <p:sldId id="296" r:id="rId34"/>
-    <p:sldId id="297" r:id="rId35"/>
-    <p:sldId id="295" r:id="rId36"/>
-    <p:sldId id="298" r:id="rId37"/>
-    <p:sldId id="272" r:id="rId38"/>
-    <p:sldId id="277" r:id="rId39"/>
-    <p:sldId id="290" r:id="rId40"/>
-    <p:sldId id="278" r:id="rId41"/>
-    <p:sldId id="293" r:id="rId42"/>
-    <p:sldId id="279" r:id="rId43"/>
-    <p:sldId id="280" r:id="rId44"/>
-    <p:sldId id="276" r:id="rId45"/>
-    <p:sldId id="273" r:id="rId46"/>
-    <p:sldId id="291" r:id="rId47"/>
-    <p:sldId id="282" r:id="rId48"/>
-    <p:sldId id="275" r:id="rId49"/>
-    <p:sldId id="281" r:id="rId50"/>
-    <p:sldId id="274" r:id="rId51"/>
-    <p:sldId id="307" r:id="rId52"/>
-    <p:sldId id="283" r:id="rId53"/>
-    <p:sldId id="284" r:id="rId54"/>
-    <p:sldId id="301" r:id="rId55"/>
-    <p:sldId id="302" r:id="rId56"/>
-    <p:sldId id="304" r:id="rId57"/>
-    <p:sldId id="313" r:id="rId58"/>
-    <p:sldId id="300" r:id="rId59"/>
+    <p:sldId id="309" r:id="rId4"/>
+    <p:sldId id="303" r:id="rId5"/>
+    <p:sldId id="314" r:id="rId6"/>
+    <p:sldId id="312" r:id="rId7"/>
+    <p:sldId id="311" r:id="rId8"/>
+    <p:sldId id="261" r:id="rId9"/>
+    <p:sldId id="299" r:id="rId10"/>
+    <p:sldId id="258" r:id="rId11"/>
+    <p:sldId id="286" r:id="rId12"/>
+    <p:sldId id="287" r:id="rId13"/>
+    <p:sldId id="288" r:id="rId14"/>
+    <p:sldId id="289" r:id="rId15"/>
+    <p:sldId id="260" r:id="rId16"/>
+    <p:sldId id="259" r:id="rId17"/>
+    <p:sldId id="292" r:id="rId18"/>
+    <p:sldId id="305" r:id="rId19"/>
+    <p:sldId id="262" r:id="rId20"/>
+    <p:sldId id="263" r:id="rId21"/>
+    <p:sldId id="306" r:id="rId22"/>
+    <p:sldId id="264" r:id="rId23"/>
+    <p:sldId id="265" r:id="rId24"/>
+    <p:sldId id="266" r:id="rId25"/>
+    <p:sldId id="267" r:id="rId26"/>
+    <p:sldId id="268" r:id="rId27"/>
+    <p:sldId id="269" r:id="rId28"/>
+    <p:sldId id="270" r:id="rId29"/>
+    <p:sldId id="271" r:id="rId30"/>
+    <p:sldId id="285" r:id="rId31"/>
+    <p:sldId id="294" r:id="rId32"/>
+    <p:sldId id="296" r:id="rId33"/>
+    <p:sldId id="297" r:id="rId34"/>
+    <p:sldId id="295" r:id="rId35"/>
+    <p:sldId id="298" r:id="rId36"/>
+    <p:sldId id="272" r:id="rId37"/>
+    <p:sldId id="277" r:id="rId38"/>
+    <p:sldId id="290" r:id="rId39"/>
+    <p:sldId id="278" r:id="rId40"/>
+    <p:sldId id="293" r:id="rId41"/>
+    <p:sldId id="279" r:id="rId42"/>
+    <p:sldId id="280" r:id="rId43"/>
+    <p:sldId id="276" r:id="rId44"/>
+    <p:sldId id="273" r:id="rId45"/>
+    <p:sldId id="291" r:id="rId46"/>
+    <p:sldId id="282" r:id="rId47"/>
+    <p:sldId id="275" r:id="rId48"/>
+    <p:sldId id="281" r:id="rId49"/>
+    <p:sldId id="274" r:id="rId50"/>
+    <p:sldId id="307" r:id="rId51"/>
+    <p:sldId id="283" r:id="rId52"/>
+    <p:sldId id="284" r:id="rId53"/>
+    <p:sldId id="301" r:id="rId54"/>
+    <p:sldId id="302" r:id="rId55"/>
+    <p:sldId id="304" r:id="rId56"/>
+    <p:sldId id="313" r:id="rId57"/>
+    <p:sldId id="300" r:id="rId58"/>
   </p:sldIdLst>
   <p:sldSz cx="12192000" cy="6858000"/>
   <p:notesSz cx="6858000" cy="9144000"/>
@@ -679,7 +678,7 @@
           <a:p>
             <a:fld id="{AFF44E0B-59D2-418D-9EC7-B0AC05D999A9}" type="slidenum">
               <a:rPr lang="en-US" smtClean="0"/>
-              <a:t>18</a:t>
+              <a:t>17</a:t>
             </a:fld>
             <a:endParaRPr lang="en-US"/>
           </a:p>
@@ -774,7 +773,7 @@
           <a:p>
             <a:fld id="{AFF44E0B-59D2-418D-9EC7-B0AC05D999A9}" type="slidenum">
               <a:rPr lang="en-US" smtClean="0"/>
-              <a:t>19</a:t>
+              <a:t>18</a:t>
             </a:fld>
             <a:endParaRPr lang="en-US"/>
           </a:p>
@@ -861,7 +860,7 @@
           <a:p>
             <a:fld id="{AFF44E0B-59D2-418D-9EC7-B0AC05D999A9}" type="slidenum">
               <a:rPr lang="en-US" smtClean="0"/>
-              <a:t>20</a:t>
+              <a:t>19</a:t>
             </a:fld>
             <a:endParaRPr lang="en-US"/>
           </a:p>
@@ -948,7 +947,7 @@
           <a:p>
             <a:fld id="{AFF44E0B-59D2-418D-9EC7-B0AC05D999A9}" type="slidenum">
               <a:rPr lang="en-US" smtClean="0"/>
-              <a:t>21</a:t>
+              <a:t>20</a:t>
             </a:fld>
             <a:endParaRPr lang="en-US"/>
           </a:p>
@@ -1035,7 +1034,7 @@
           <a:p>
             <a:fld id="{AFF44E0B-59D2-418D-9EC7-B0AC05D999A9}" type="slidenum">
               <a:rPr lang="en-US" smtClean="0"/>
-              <a:t>22</a:t>
+              <a:t>21</a:t>
             </a:fld>
             <a:endParaRPr lang="en-US"/>
           </a:p>
@@ -1119,7 +1118,7 @@
           <a:p>
             <a:fld id="{AFF44E0B-59D2-418D-9EC7-B0AC05D999A9}" type="slidenum">
               <a:rPr lang="en-US" smtClean="0"/>
-              <a:t>23</a:t>
+              <a:t>22</a:t>
             </a:fld>
             <a:endParaRPr lang="en-US"/>
           </a:p>
@@ -1206,7 +1205,7 @@
           <a:p>
             <a:fld id="{AFF44E0B-59D2-418D-9EC7-B0AC05D999A9}" type="slidenum">
               <a:rPr lang="en-US" smtClean="0"/>
-              <a:t>24</a:t>
+              <a:t>23</a:t>
             </a:fld>
             <a:endParaRPr lang="en-US"/>
           </a:p>
@@ -1293,7 +1292,7 @@
           <a:p>
             <a:fld id="{AFF44E0B-59D2-418D-9EC7-B0AC05D999A9}" type="slidenum">
               <a:rPr lang="en-US" smtClean="0"/>
-              <a:t>25</a:t>
+              <a:t>24</a:t>
             </a:fld>
             <a:endParaRPr lang="en-US"/>
           </a:p>
@@ -1380,7 +1379,7 @@
           <a:p>
             <a:fld id="{AFF44E0B-59D2-418D-9EC7-B0AC05D999A9}" type="slidenum">
               <a:rPr lang="en-US" smtClean="0"/>
-              <a:t>26</a:t>
+              <a:t>25</a:t>
             </a:fld>
             <a:endParaRPr lang="en-US"/>
           </a:p>
@@ -1467,7 +1466,7 @@
           <a:p>
             <a:fld id="{AFF44E0B-59D2-418D-9EC7-B0AC05D999A9}" type="slidenum">
               <a:rPr lang="en-US" smtClean="0"/>
-              <a:t>27</a:t>
+              <a:t>26</a:t>
             </a:fld>
             <a:endParaRPr lang="en-US"/>
           </a:p>
@@ -1554,7 +1553,7 @@
           <a:p>
             <a:fld id="{AFF44E0B-59D2-418D-9EC7-B0AC05D999A9}" type="slidenum">
               <a:rPr lang="en-US" smtClean="0"/>
-              <a:t>4</a:t>
+              <a:t>3</a:t>
             </a:fld>
             <a:endParaRPr lang="en-US"/>
           </a:p>
@@ -1641,7 +1640,7 @@
           <a:p>
             <a:fld id="{AFF44E0B-59D2-418D-9EC7-B0AC05D999A9}" type="slidenum">
               <a:rPr lang="en-US" smtClean="0"/>
-              <a:t>28</a:t>
+              <a:t>27</a:t>
             </a:fld>
             <a:endParaRPr lang="en-US"/>
           </a:p>
@@ -1728,7 +1727,7 @@
           <a:p>
             <a:fld id="{AFF44E0B-59D2-418D-9EC7-B0AC05D999A9}" type="slidenum">
               <a:rPr lang="en-US" smtClean="0"/>
-              <a:t>31</a:t>
+              <a:t>30</a:t>
             </a:fld>
             <a:endParaRPr lang="en-US"/>
           </a:p>
@@ -1823,7 +1822,7 @@
           <a:p>
             <a:fld id="{AFF44E0B-59D2-418D-9EC7-B0AC05D999A9}" type="slidenum">
               <a:rPr lang="en-US" smtClean="0"/>
-              <a:t>32</a:t>
+              <a:t>31</a:t>
             </a:fld>
             <a:endParaRPr lang="en-US"/>
           </a:p>
@@ -1907,7 +1906,7 @@
           <a:p>
             <a:fld id="{AFF44E0B-59D2-418D-9EC7-B0AC05D999A9}" type="slidenum">
               <a:rPr lang="en-US" smtClean="0"/>
-              <a:t>33</a:t>
+              <a:t>32</a:t>
             </a:fld>
             <a:endParaRPr lang="en-US"/>
           </a:p>
@@ -1994,7 +1993,7 @@
           <a:p>
             <a:fld id="{AFF44E0B-59D2-418D-9EC7-B0AC05D999A9}" type="slidenum">
               <a:rPr lang="en-US" smtClean="0"/>
-              <a:t>34</a:t>
+              <a:t>33</a:t>
             </a:fld>
             <a:endParaRPr lang="en-US"/>
           </a:p>
@@ -2081,7 +2080,7 @@
           <a:p>
             <a:fld id="{AFF44E0B-59D2-418D-9EC7-B0AC05D999A9}" type="slidenum">
               <a:rPr lang="en-US" smtClean="0"/>
-              <a:t>35</a:t>
+              <a:t>34</a:t>
             </a:fld>
             <a:endParaRPr lang="en-US"/>
           </a:p>
@@ -2165,7 +2164,7 @@
           <a:p>
             <a:fld id="{AFF44E0B-59D2-418D-9EC7-B0AC05D999A9}" type="slidenum">
               <a:rPr lang="en-US" smtClean="0"/>
-              <a:t>36</a:t>
+              <a:t>35</a:t>
             </a:fld>
             <a:endParaRPr lang="en-US"/>
           </a:p>
@@ -2268,7 +2267,7 @@
           <a:p>
             <a:fld id="{AFF44E0B-59D2-418D-9EC7-B0AC05D999A9}" type="slidenum">
               <a:rPr lang="en-US" smtClean="0"/>
-              <a:t>38</a:t>
+              <a:t>37</a:t>
             </a:fld>
             <a:endParaRPr lang="en-US"/>
           </a:p>
@@ -2355,7 +2354,7 @@
           <a:p>
             <a:fld id="{AFF44E0B-59D2-418D-9EC7-B0AC05D999A9}" type="slidenum">
               <a:rPr lang="en-US" smtClean="0"/>
-              <a:t>40</a:t>
+              <a:t>39</a:t>
             </a:fld>
             <a:endParaRPr lang="en-US"/>
           </a:p>
@@ -2442,7 +2441,7 @@
           <a:p>
             <a:fld id="{AFF44E0B-59D2-418D-9EC7-B0AC05D999A9}" type="slidenum">
               <a:rPr lang="en-US" smtClean="0"/>
-              <a:t>41</a:t>
+              <a:t>40</a:t>
             </a:fld>
             <a:endParaRPr lang="en-US"/>
           </a:p>
@@ -2529,7 +2528,7 @@
           <a:p>
             <a:fld id="{AFF44E0B-59D2-418D-9EC7-B0AC05D999A9}" type="slidenum">
               <a:rPr lang="en-US" smtClean="0"/>
-              <a:t>5</a:t>
+              <a:t>4</a:t>
             </a:fld>
             <a:endParaRPr lang="en-US"/>
           </a:p>
@@ -2616,7 +2615,7 @@
           <a:p>
             <a:fld id="{AFF44E0B-59D2-418D-9EC7-B0AC05D999A9}" type="slidenum">
               <a:rPr lang="en-US" smtClean="0"/>
-              <a:t>42</a:t>
+              <a:t>41</a:t>
             </a:fld>
             <a:endParaRPr lang="en-US"/>
           </a:p>
@@ -2736,7 +2735,7 @@
           <a:p>
             <a:fld id="{AFF44E0B-59D2-418D-9EC7-B0AC05D999A9}" type="slidenum">
               <a:rPr lang="en-US" smtClean="0"/>
-              <a:t>43</a:t>
+              <a:t>42</a:t>
             </a:fld>
             <a:endParaRPr lang="en-US"/>
           </a:p>
@@ -2823,7 +2822,7 @@
           <a:p>
             <a:fld id="{AFF44E0B-59D2-418D-9EC7-B0AC05D999A9}" type="slidenum">
               <a:rPr lang="en-US" smtClean="0"/>
-              <a:t>44</a:t>
+              <a:t>43</a:t>
             </a:fld>
             <a:endParaRPr lang="en-US"/>
           </a:p>
@@ -2910,7 +2909,7 @@
           <a:p>
             <a:fld id="{AFF44E0B-59D2-418D-9EC7-B0AC05D999A9}" type="slidenum">
               <a:rPr lang="en-US" smtClean="0"/>
-              <a:t>45</a:t>
+              <a:t>44</a:t>
             </a:fld>
             <a:endParaRPr lang="en-US"/>
           </a:p>
@@ -2997,7 +2996,7 @@
           <a:p>
             <a:fld id="{AFF44E0B-59D2-418D-9EC7-B0AC05D999A9}" type="slidenum">
               <a:rPr lang="en-US" smtClean="0"/>
-              <a:t>47</a:t>
+              <a:t>46</a:t>
             </a:fld>
             <a:endParaRPr lang="en-US"/>
           </a:p>
@@ -3084,7 +3083,7 @@
           <a:p>
             <a:fld id="{AFF44E0B-59D2-418D-9EC7-B0AC05D999A9}" type="slidenum">
               <a:rPr lang="en-US" smtClean="0"/>
-              <a:t>49</a:t>
+              <a:t>48</a:t>
             </a:fld>
             <a:endParaRPr lang="en-US"/>
           </a:p>
@@ -3171,7 +3170,7 @@
           <a:p>
             <a:fld id="{AFF44E0B-59D2-418D-9EC7-B0AC05D999A9}" type="slidenum">
               <a:rPr lang="en-US" smtClean="0"/>
-              <a:t>50</a:t>
+              <a:t>49</a:t>
             </a:fld>
             <a:endParaRPr lang="en-US"/>
           </a:p>
@@ -3258,7 +3257,7 @@
           <a:p>
             <a:fld id="{AFF44E0B-59D2-418D-9EC7-B0AC05D999A9}" type="slidenum">
               <a:rPr lang="en-US" smtClean="0"/>
-              <a:t>51</a:t>
+              <a:t>50</a:t>
             </a:fld>
             <a:endParaRPr lang="en-US"/>
           </a:p>
@@ -3345,7 +3344,7 @@
           <a:p>
             <a:fld id="{AFF44E0B-59D2-418D-9EC7-B0AC05D999A9}" type="slidenum">
               <a:rPr lang="en-US" smtClean="0"/>
-              <a:t>52</a:t>
+              <a:t>51</a:t>
             </a:fld>
             <a:endParaRPr lang="en-US"/>
           </a:p>
@@ -3432,7 +3431,7 @@
           <a:p>
             <a:fld id="{AFF44E0B-59D2-418D-9EC7-B0AC05D999A9}" type="slidenum">
               <a:rPr lang="en-US" smtClean="0"/>
-              <a:t>53</a:t>
+              <a:t>52</a:t>
             </a:fld>
             <a:endParaRPr lang="en-US"/>
           </a:p>
@@ -3519,7 +3518,7 @@
           <a:p>
             <a:fld id="{AFF44E0B-59D2-418D-9EC7-B0AC05D999A9}" type="slidenum">
               <a:rPr lang="en-US" smtClean="0"/>
-              <a:t>7</a:t>
+              <a:t>6</a:t>
             </a:fld>
             <a:endParaRPr lang="en-US"/>
           </a:p>
@@ -3603,7 +3602,7 @@
           <a:p>
             <a:fld id="{AFF44E0B-59D2-418D-9EC7-B0AC05D999A9}" type="slidenum">
               <a:rPr lang="en-US" smtClean="0"/>
-              <a:t>54</a:t>
+              <a:t>53</a:t>
             </a:fld>
             <a:endParaRPr lang="en-US"/>
           </a:p>
@@ -3698,7 +3697,7 @@
           <a:p>
             <a:fld id="{AFF44E0B-59D2-418D-9EC7-B0AC05D999A9}" type="slidenum">
               <a:rPr lang="en-US" smtClean="0"/>
-              <a:t>55</a:t>
+              <a:t>54</a:t>
             </a:fld>
             <a:endParaRPr lang="en-US"/>
           </a:p>
@@ -3785,7 +3784,7 @@
           <a:p>
             <a:fld id="{AFF44E0B-59D2-418D-9EC7-B0AC05D999A9}" type="slidenum">
               <a:rPr lang="en-US" smtClean="0"/>
-              <a:t>56</a:t>
+              <a:t>55</a:t>
             </a:fld>
             <a:endParaRPr lang="en-US"/>
           </a:p>
@@ -3872,7 +3871,7 @@
           <a:p>
             <a:fld id="{AFF44E0B-59D2-418D-9EC7-B0AC05D999A9}" type="slidenum">
               <a:rPr lang="en-US" smtClean="0"/>
-              <a:t>10</a:t>
+              <a:t>9</a:t>
             </a:fld>
             <a:endParaRPr lang="en-US"/>
           </a:p>
@@ -3959,7 +3958,7 @@
           <a:p>
             <a:fld id="{AFF44E0B-59D2-418D-9EC7-B0AC05D999A9}" type="slidenum">
               <a:rPr lang="en-US" smtClean="0"/>
-              <a:t>11</a:t>
+              <a:t>10</a:t>
             </a:fld>
             <a:endParaRPr lang="en-US"/>
           </a:p>
@@ -4046,7 +4045,7 @@
           <a:p>
             <a:fld id="{AFF44E0B-59D2-418D-9EC7-B0AC05D999A9}" type="slidenum">
               <a:rPr lang="en-US" smtClean="0"/>
-              <a:t>12</a:t>
+              <a:t>11</a:t>
             </a:fld>
             <a:endParaRPr lang="en-US"/>
           </a:p>
@@ -4138,7 +4137,7 @@
           <a:p>
             <a:fld id="{AFF44E0B-59D2-418D-9EC7-B0AC05D999A9}" type="slidenum">
               <a:rPr lang="en-US" smtClean="0"/>
-              <a:t>14</a:t>
+              <a:t>13</a:t>
             </a:fld>
             <a:endParaRPr lang="en-US"/>
           </a:p>
@@ -4225,7 +4224,7 @@
           <a:p>
             <a:fld id="{AFF44E0B-59D2-418D-9EC7-B0AC05D999A9}" type="slidenum">
               <a:rPr lang="en-US" smtClean="0"/>
-              <a:t>17</a:t>
+              <a:t>16</a:t>
             </a:fld>
             <a:endParaRPr lang="en-US"/>
           </a:p>
@@ -12434,6 +12433,45 @@
           </a:p>
         </p:txBody>
       </p:sp>
+      <p:sp>
+        <p:nvSpPr>
+          <p:cNvPr id="9" name="TextBox 8">
+            <a:extLst>
+              <a:ext uri="{FF2B5EF4-FFF2-40B4-BE49-F238E27FC236}">
+                <a16:creationId xmlns:a16="http://schemas.microsoft.com/office/drawing/2014/main" id="{BE7CE8BD-A526-4A73-A871-2D5D9BBDD28F}"/>
+              </a:ext>
+            </a:extLst>
+          </p:cNvPr>
+          <p:cNvSpPr txBox="1"/>
+          <p:nvPr/>
+        </p:nvSpPr>
+        <p:spPr>
+          <a:xfrm>
+            <a:off x="678929" y="5853622"/>
+            <a:ext cx="10834141" cy="523220"/>
+          </a:xfrm>
+          <a:prstGeom prst="rect">
+            <a:avLst/>
+          </a:prstGeom>
+          <a:noFill/>
+        </p:spPr>
+        <p:txBody>
+          <a:bodyPr wrap="square">
+            <a:spAutoFit/>
+          </a:bodyPr>
+          <a:lstStyle/>
+          <a:p>
+            <a:r>
+              <a:rPr lang="en-US" sz="2800" dirty="0">
+                <a:solidFill>
+                  <a:schemeClr val="bg1"/>
+                </a:solidFill>
+              </a:rPr>
+              <a:t>https://github.com/mattnorby/Using-Algorithms-to-Solve-Hard-Problems</a:t>
+            </a:r>
+          </a:p>
+        </p:txBody>
+      </p:sp>
     </p:spTree>
     <p:extLst>
       <p:ext uri="{BB962C8B-B14F-4D97-AF65-F5344CB8AC3E}">
@@ -12561,118 +12599,6 @@
           <p:cNvPr id="2" name="Title 1">
             <a:extLst>
               <a:ext uri="{FF2B5EF4-FFF2-40B4-BE49-F238E27FC236}">
-                <a16:creationId xmlns:a16="http://schemas.microsoft.com/office/drawing/2014/main" id="{1F36936C-B97A-4466-BED5-BCCAFAF06FB2}"/>
-              </a:ext>
-            </a:extLst>
-          </p:cNvPr>
-          <p:cNvSpPr>
-            <a:spLocks noGrp="1"/>
-          </p:cNvSpPr>
-          <p:nvPr>
-            <p:ph type="title"/>
-          </p:nvPr>
-        </p:nvSpPr>
-        <p:spPr>
-          <a:xfrm>
-            <a:off x="685801" y="609600"/>
-            <a:ext cx="10781674" cy="3842479"/>
-          </a:xfrm>
-        </p:spPr>
-        <p:txBody>
-          <a:bodyPr anchor="ctr">
-            <a:normAutofit/>
-          </a:bodyPr>
-          <a:lstStyle/>
-          <a:p>
-            <a:pPr algn="ctr"/>
-            <a:r>
-              <a:rPr lang="en-US" sz="5400" dirty="0"/>
-              <a:t>A quick “big O” primer</a:t>
-            </a:r>
-          </a:p>
-        </p:txBody>
-      </p:sp>
-      <p:sp>
-        <p:nvSpPr>
-          <p:cNvPr id="3" name="TextBox 2">
-            <a:extLst>
-              <a:ext uri="{FF2B5EF4-FFF2-40B4-BE49-F238E27FC236}">
-                <a16:creationId xmlns:a16="http://schemas.microsoft.com/office/drawing/2014/main" id="{E3716B82-8AE4-46EE-807F-F0D1A0551E69}"/>
-              </a:ext>
-            </a:extLst>
-          </p:cNvPr>
-          <p:cNvSpPr txBox="1"/>
-          <p:nvPr/>
-        </p:nvSpPr>
-        <p:spPr>
-          <a:xfrm>
-            <a:off x="5418717" y="3429000"/>
-            <a:ext cx="1354565" cy="1569660"/>
-          </a:xfrm>
-          <a:prstGeom prst="rect">
-            <a:avLst/>
-          </a:prstGeom>
-          <a:noFill/>
-        </p:spPr>
-        <p:txBody>
-          <a:bodyPr wrap="square" rtlCol="0" anchor="ctr">
-            <a:spAutoFit/>
-          </a:bodyPr>
-          <a:lstStyle/>
-          <a:p>
-            <a:pPr algn="ctr"/>
-            <a:r>
-              <a:rPr lang="en-US" sz="9600" dirty="0">
-                <a:effectLst>
-                  <a:outerShdw blurRad="50800" dist="50800" dir="7200000" algn="ctr" rotWithShape="0">
-                    <a:schemeClr val="tx1">
-                      <a:lumMod val="65000"/>
-                    </a:schemeClr>
-                  </a:outerShdw>
-                </a:effectLst>
-                <a:latin typeface="Times New Roman" panose="02020603050405020304" pitchFamily="18" charset="0"/>
-                <a:cs typeface="Times New Roman" panose="02020603050405020304" pitchFamily="18" charset="0"/>
-              </a:rPr>
-              <a:t>O</a:t>
-            </a:r>
-          </a:p>
-        </p:txBody>
-      </p:sp>
-    </p:spTree>
-    <p:extLst>
-      <p:ext uri="{BB962C8B-B14F-4D97-AF65-F5344CB8AC3E}">
-        <p14:creationId xmlns:p14="http://schemas.microsoft.com/office/powerpoint/2010/main" val="343561814"/>
-      </p:ext>
-    </p:extLst>
-  </p:cSld>
-  <p:clrMapOvr>
-    <a:masterClrMapping/>
-  </p:clrMapOvr>
-</p:sld>
-</file>
-
-<file path=ppt/slides/slide11.xml><?xml version="1.0" encoding="utf-8"?>
-<p:sld xmlns:a="http://schemas.openxmlformats.org/drawingml/2006/main" xmlns:r="http://schemas.openxmlformats.org/officeDocument/2006/relationships" xmlns:p="http://schemas.openxmlformats.org/presentationml/2006/main">
-  <p:cSld>
-    <p:spTree>
-      <p:nvGrpSpPr>
-        <p:cNvPr id="1" name=""/>
-        <p:cNvGrpSpPr/>
-        <p:nvPr/>
-      </p:nvGrpSpPr>
-      <p:grpSpPr>
-        <a:xfrm>
-          <a:off x="0" y="0"/>
-          <a:ext cx="0" cy="0"/>
-          <a:chOff x="0" y="0"/>
-          <a:chExt cx="0" cy="0"/>
-        </a:xfrm>
-      </p:grpSpPr>
-      <p:sp>
-        <p:nvSpPr>
-          <p:cNvPr id="2" name="Title 1">
-            <a:extLst>
-              <a:ext uri="{FF2B5EF4-FFF2-40B4-BE49-F238E27FC236}">
                 <a16:creationId xmlns:a16="http://schemas.microsoft.com/office/drawing/2014/main" id="{0A42B16F-5F0B-4F17-BB30-400779CD6C25}"/>
               </a:ext>
             </a:extLst>
@@ -12907,7 +12833,7 @@
 </p:sld>
 </file>
 
-<file path=ppt/slides/slide12.xml><?xml version="1.0" encoding="utf-8"?>
+<file path=ppt/slides/slide11.xml><?xml version="1.0" encoding="utf-8"?>
 <p:sld xmlns:a="http://schemas.openxmlformats.org/drawingml/2006/main" xmlns:r="http://schemas.openxmlformats.org/officeDocument/2006/relationships" xmlns:p="http://schemas.openxmlformats.org/presentationml/2006/main">
   <p:cSld>
     <p:spTree>
@@ -13805,6 +13731,306 @@
 </p:sld>
 </file>
 
+<file path=ppt/slides/slide12.xml><?xml version="1.0" encoding="utf-8"?>
+<p:sld xmlns:a="http://schemas.openxmlformats.org/drawingml/2006/main" xmlns:r="http://schemas.openxmlformats.org/officeDocument/2006/relationships" xmlns:p="http://schemas.openxmlformats.org/presentationml/2006/main">
+  <p:cSld>
+    <p:spTree>
+      <p:nvGrpSpPr>
+        <p:cNvPr id="1" name=""/>
+        <p:cNvGrpSpPr/>
+        <p:nvPr/>
+      </p:nvGrpSpPr>
+      <p:grpSpPr>
+        <a:xfrm>
+          <a:off x="0" y="0"/>
+          <a:ext cx="0" cy="0"/>
+          <a:chOff x="0" y="0"/>
+          <a:chExt cx="0" cy="0"/>
+        </a:xfrm>
+      </p:grpSpPr>
+      <p:sp>
+        <p:nvSpPr>
+          <p:cNvPr id="2" name="Title 1">
+            <a:extLst>
+              <a:ext uri="{FF2B5EF4-FFF2-40B4-BE49-F238E27FC236}">
+                <a16:creationId xmlns:a16="http://schemas.microsoft.com/office/drawing/2014/main" id="{0A42B16F-5F0B-4F17-BB30-400779CD6C25}"/>
+              </a:ext>
+            </a:extLst>
+          </p:cNvPr>
+          <p:cNvSpPr>
+            <a:spLocks noGrp="1"/>
+          </p:cNvSpPr>
+          <p:nvPr>
+            <p:ph type="title"/>
+          </p:nvPr>
+        </p:nvSpPr>
+        <p:spPr/>
+        <p:txBody>
+          <a:bodyPr anchor="t"/>
+          <a:lstStyle/>
+          <a:p>
+            <a:r>
+              <a:rPr lang="en-US" dirty="0"/>
+              <a:t>“Big O” notation: Array Access</a:t>
+            </a:r>
+          </a:p>
+        </p:txBody>
+      </p:sp>
+      <p:sp>
+        <p:nvSpPr>
+          <p:cNvPr id="3" name="Content Placeholder 2">
+            <a:extLst>
+              <a:ext uri="{FF2B5EF4-FFF2-40B4-BE49-F238E27FC236}">
+                <a16:creationId xmlns:a16="http://schemas.microsoft.com/office/drawing/2014/main" id="{46E753FB-D207-459F-9418-DB2DC834D5A6}"/>
+              </a:ext>
+            </a:extLst>
+          </p:cNvPr>
+          <p:cNvSpPr>
+            <a:spLocks noGrp="1"/>
+          </p:cNvSpPr>
+          <p:nvPr>
+            <p:ph idx="1"/>
+          </p:nvPr>
+        </p:nvSpPr>
+        <p:spPr>
+          <a:xfrm>
+            <a:off x="838200" y="1459865"/>
+            <a:ext cx="10515600" cy="5033010"/>
+          </a:xfrm>
+        </p:spPr>
+        <p:txBody>
+          <a:bodyPr anchor="t">
+            <a:normAutofit/>
+          </a:bodyPr>
+          <a:lstStyle/>
+          <a:p>
+            <a:pPr marL="0" indent="0">
+              <a:buNone/>
+            </a:pPr>
+            <a:r>
+              <a:rPr lang="en-US" sz="2800" dirty="0"/>
+              <a:t>Reading or writing every element of an array is </a:t>
+            </a:r>
+            <a:r>
+              <a:rPr lang="en-US" sz="2800" b="1" dirty="0"/>
+              <a:t>O(n)</a:t>
+            </a:r>
+            <a:r>
+              <a:rPr lang="en-US" sz="2800" dirty="0"/>
+              <a:t>.</a:t>
+            </a:r>
+          </a:p>
+          <a:p>
+            <a:pPr marL="0" indent="0">
+              <a:buNone/>
+            </a:pPr>
+            <a:endParaRPr lang="en-US" sz="2800" dirty="0"/>
+          </a:p>
+          <a:p>
+            <a:pPr marL="0" indent="0">
+              <a:buNone/>
+            </a:pPr>
+            <a:r>
+              <a:rPr lang="en-US" sz="2800" dirty="0">
+                <a:latin typeface="Courier New" panose="02070309020205020404" pitchFamily="49" charset="0"/>
+                <a:cs typeface="Courier New" panose="02070309020205020404" pitchFamily="49" charset="0"/>
+              </a:rPr>
+              <a:t>public int[] </a:t>
+            </a:r>
+            <a:r>
+              <a:rPr lang="en-US" sz="2800" dirty="0" err="1">
+                <a:latin typeface="Courier New" panose="02070309020205020404" pitchFamily="49" charset="0"/>
+                <a:cs typeface="Courier New" panose="02070309020205020404" pitchFamily="49" charset="0"/>
+              </a:rPr>
+              <a:t>createIndexArray</a:t>
+            </a:r>
+            <a:r>
+              <a:rPr lang="en-US" sz="2800" dirty="0">
+                <a:latin typeface="Courier New" panose="02070309020205020404" pitchFamily="49" charset="0"/>
+                <a:cs typeface="Courier New" panose="02070309020205020404" pitchFamily="49" charset="0"/>
+              </a:rPr>
+              <a:t>(int n) {</a:t>
+            </a:r>
+            <a:br>
+              <a:rPr lang="en-US" sz="2800" dirty="0">
+                <a:latin typeface="Courier New" panose="02070309020205020404" pitchFamily="49" charset="0"/>
+                <a:cs typeface="Courier New" panose="02070309020205020404" pitchFamily="49" charset="0"/>
+              </a:rPr>
+            </a:br>
+            <a:r>
+              <a:rPr lang="en-US" sz="2800" dirty="0">
+                <a:latin typeface="Courier New" panose="02070309020205020404" pitchFamily="49" charset="0"/>
+                <a:cs typeface="Courier New" panose="02070309020205020404" pitchFamily="49" charset="0"/>
+              </a:rPr>
+              <a:t>	int[] </a:t>
+            </a:r>
+            <a:r>
+              <a:rPr lang="en-US" sz="2800" dirty="0" err="1">
+                <a:latin typeface="Courier New" panose="02070309020205020404" pitchFamily="49" charset="0"/>
+                <a:cs typeface="Courier New" panose="02070309020205020404" pitchFamily="49" charset="0"/>
+              </a:rPr>
+              <a:t>arr</a:t>
+            </a:r>
+            <a:r>
+              <a:rPr lang="en-US" sz="2800" dirty="0">
+                <a:latin typeface="Courier New" panose="02070309020205020404" pitchFamily="49" charset="0"/>
+                <a:cs typeface="Courier New" panose="02070309020205020404" pitchFamily="49" charset="0"/>
+              </a:rPr>
+              <a:t> = new int[n];</a:t>
+            </a:r>
+            <a:br>
+              <a:rPr lang="en-US" sz="2800" dirty="0">
+                <a:latin typeface="Courier New" panose="02070309020205020404" pitchFamily="49" charset="0"/>
+                <a:cs typeface="Courier New" panose="02070309020205020404" pitchFamily="49" charset="0"/>
+              </a:rPr>
+            </a:br>
+            <a:r>
+              <a:rPr lang="en-US" sz="2800" dirty="0">
+                <a:latin typeface="Courier New" panose="02070309020205020404" pitchFamily="49" charset="0"/>
+                <a:cs typeface="Courier New" panose="02070309020205020404" pitchFamily="49" charset="0"/>
+              </a:rPr>
+              <a:t>	for (int </a:t>
+            </a:r>
+            <a:r>
+              <a:rPr lang="en-US" sz="2800" dirty="0" err="1">
+                <a:latin typeface="Courier New" panose="02070309020205020404" pitchFamily="49" charset="0"/>
+                <a:cs typeface="Courier New" panose="02070309020205020404" pitchFamily="49" charset="0"/>
+              </a:rPr>
+              <a:t>i</a:t>
+            </a:r>
+            <a:r>
+              <a:rPr lang="en-US" sz="2800" dirty="0">
+                <a:latin typeface="Courier New" panose="02070309020205020404" pitchFamily="49" charset="0"/>
+                <a:cs typeface="Courier New" panose="02070309020205020404" pitchFamily="49" charset="0"/>
+              </a:rPr>
+              <a:t> = 0; </a:t>
+            </a:r>
+            <a:r>
+              <a:rPr lang="en-US" sz="2800" dirty="0" err="1">
+                <a:latin typeface="Courier New" panose="02070309020205020404" pitchFamily="49" charset="0"/>
+                <a:cs typeface="Courier New" panose="02070309020205020404" pitchFamily="49" charset="0"/>
+              </a:rPr>
+              <a:t>i</a:t>
+            </a:r>
+            <a:r>
+              <a:rPr lang="en-US" sz="2800" dirty="0">
+                <a:latin typeface="Courier New" panose="02070309020205020404" pitchFamily="49" charset="0"/>
+                <a:cs typeface="Courier New" panose="02070309020205020404" pitchFamily="49" charset="0"/>
+              </a:rPr>
+              <a:t> &lt; n; </a:t>
+            </a:r>
+            <a:r>
+              <a:rPr lang="en-US" sz="2800" dirty="0" err="1">
+                <a:latin typeface="Courier New" panose="02070309020205020404" pitchFamily="49" charset="0"/>
+                <a:cs typeface="Courier New" panose="02070309020205020404" pitchFamily="49" charset="0"/>
+              </a:rPr>
+              <a:t>i</a:t>
+            </a:r>
+            <a:r>
+              <a:rPr lang="en-US" sz="2800" dirty="0">
+                <a:latin typeface="Courier New" panose="02070309020205020404" pitchFamily="49" charset="0"/>
+                <a:cs typeface="Courier New" panose="02070309020205020404" pitchFamily="49" charset="0"/>
+              </a:rPr>
+              <a:t>++) </a:t>
+            </a:r>
+            <a:r>
+              <a:rPr lang="en-US" sz="2800" dirty="0" err="1">
+                <a:latin typeface="Courier New" panose="02070309020205020404" pitchFamily="49" charset="0"/>
+                <a:cs typeface="Courier New" panose="02070309020205020404" pitchFamily="49" charset="0"/>
+              </a:rPr>
+              <a:t>arr</a:t>
+            </a:r>
+            <a:r>
+              <a:rPr lang="en-US" sz="2800" dirty="0">
+                <a:latin typeface="Courier New" panose="02070309020205020404" pitchFamily="49" charset="0"/>
+                <a:cs typeface="Courier New" panose="02070309020205020404" pitchFamily="49" charset="0"/>
+              </a:rPr>
+              <a:t>[</a:t>
+            </a:r>
+            <a:r>
+              <a:rPr lang="en-US" sz="2800" dirty="0" err="1">
+                <a:latin typeface="Courier New" panose="02070309020205020404" pitchFamily="49" charset="0"/>
+                <a:cs typeface="Courier New" panose="02070309020205020404" pitchFamily="49" charset="0"/>
+              </a:rPr>
+              <a:t>i</a:t>
+            </a:r>
+            <a:r>
+              <a:rPr lang="en-US" sz="2800" dirty="0">
+                <a:latin typeface="Courier New" panose="02070309020205020404" pitchFamily="49" charset="0"/>
+                <a:cs typeface="Courier New" panose="02070309020205020404" pitchFamily="49" charset="0"/>
+              </a:rPr>
+              <a:t>] = </a:t>
+            </a:r>
+            <a:r>
+              <a:rPr lang="en-US" sz="2800" dirty="0" err="1">
+                <a:latin typeface="Courier New" panose="02070309020205020404" pitchFamily="49" charset="0"/>
+                <a:cs typeface="Courier New" panose="02070309020205020404" pitchFamily="49" charset="0"/>
+              </a:rPr>
+              <a:t>i</a:t>
+            </a:r>
+            <a:r>
+              <a:rPr lang="en-US" sz="2800" dirty="0">
+                <a:latin typeface="Courier New" panose="02070309020205020404" pitchFamily="49" charset="0"/>
+                <a:cs typeface="Courier New" panose="02070309020205020404" pitchFamily="49" charset="0"/>
+              </a:rPr>
+              <a:t>;</a:t>
+            </a:r>
+            <a:br>
+              <a:rPr lang="en-US" sz="2800" dirty="0">
+                <a:latin typeface="Courier New" panose="02070309020205020404" pitchFamily="49" charset="0"/>
+                <a:cs typeface="Courier New" panose="02070309020205020404" pitchFamily="49" charset="0"/>
+              </a:rPr>
+            </a:br>
+            <a:r>
+              <a:rPr lang="en-US" sz="2800" dirty="0">
+                <a:latin typeface="Courier New" panose="02070309020205020404" pitchFamily="49" charset="0"/>
+                <a:cs typeface="Courier New" panose="02070309020205020404" pitchFamily="49" charset="0"/>
+              </a:rPr>
+              <a:t>	return </a:t>
+            </a:r>
+            <a:r>
+              <a:rPr lang="en-US" sz="2800" dirty="0" err="1">
+                <a:latin typeface="Courier New" panose="02070309020205020404" pitchFamily="49" charset="0"/>
+                <a:cs typeface="Courier New" panose="02070309020205020404" pitchFamily="49" charset="0"/>
+              </a:rPr>
+              <a:t>arr</a:t>
+            </a:r>
+            <a:r>
+              <a:rPr lang="en-US" sz="2800" dirty="0">
+                <a:latin typeface="Courier New" panose="02070309020205020404" pitchFamily="49" charset="0"/>
+                <a:cs typeface="Courier New" panose="02070309020205020404" pitchFamily="49" charset="0"/>
+              </a:rPr>
+              <a:t>;</a:t>
+            </a:r>
+            <a:br>
+              <a:rPr lang="en-US" sz="2800" dirty="0">
+                <a:latin typeface="Courier New" panose="02070309020205020404" pitchFamily="49" charset="0"/>
+                <a:cs typeface="Courier New" panose="02070309020205020404" pitchFamily="49" charset="0"/>
+              </a:rPr>
+            </a:br>
+            <a:r>
+              <a:rPr lang="en-US" sz="2800" dirty="0">
+                <a:latin typeface="Courier New" panose="02070309020205020404" pitchFamily="49" charset="0"/>
+                <a:cs typeface="Courier New" panose="02070309020205020404" pitchFamily="49" charset="0"/>
+              </a:rPr>
+              <a:t>}</a:t>
+            </a:r>
+          </a:p>
+        </p:txBody>
+      </p:sp>
+    </p:spTree>
+    <p:extLst>
+      <p:ext uri="{BB962C8B-B14F-4D97-AF65-F5344CB8AC3E}">
+        <p14:creationId xmlns:p14="http://schemas.microsoft.com/office/powerpoint/2010/main" val="2104516552"/>
+      </p:ext>
+    </p:extLst>
+  </p:cSld>
+  <p:clrMapOvr>
+    <a:masterClrMapping/>
+  </p:clrMapOvr>
+</p:sld>
+</file>
+
 <file path=ppt/slides/slide13.xml><?xml version="1.0" encoding="utf-8"?>
 <p:sld xmlns:a="http://schemas.openxmlformats.org/drawingml/2006/main" xmlns:r="http://schemas.openxmlformats.org/officeDocument/2006/relationships" xmlns:p="http://schemas.openxmlformats.org/presentationml/2006/main">
   <p:cSld>
@@ -13845,306 +14071,6 @@
           <a:p>
             <a:r>
               <a:rPr lang="en-US" dirty="0"/>
-              <a:t>“Big O” notation: Array Access</a:t>
-            </a:r>
-          </a:p>
-        </p:txBody>
-      </p:sp>
-      <p:sp>
-        <p:nvSpPr>
-          <p:cNvPr id="3" name="Content Placeholder 2">
-            <a:extLst>
-              <a:ext uri="{FF2B5EF4-FFF2-40B4-BE49-F238E27FC236}">
-                <a16:creationId xmlns:a16="http://schemas.microsoft.com/office/drawing/2014/main" id="{46E753FB-D207-459F-9418-DB2DC834D5A6}"/>
-              </a:ext>
-            </a:extLst>
-          </p:cNvPr>
-          <p:cNvSpPr>
-            <a:spLocks noGrp="1"/>
-          </p:cNvSpPr>
-          <p:nvPr>
-            <p:ph idx="1"/>
-          </p:nvPr>
-        </p:nvSpPr>
-        <p:spPr>
-          <a:xfrm>
-            <a:off x="838200" y="1459865"/>
-            <a:ext cx="10515600" cy="5033010"/>
-          </a:xfrm>
-        </p:spPr>
-        <p:txBody>
-          <a:bodyPr anchor="t">
-            <a:normAutofit/>
-          </a:bodyPr>
-          <a:lstStyle/>
-          <a:p>
-            <a:pPr marL="0" indent="0">
-              <a:buNone/>
-            </a:pPr>
-            <a:r>
-              <a:rPr lang="en-US" sz="2800" dirty="0"/>
-              <a:t>Reading or writing every element of an array is </a:t>
-            </a:r>
-            <a:r>
-              <a:rPr lang="en-US" sz="2800" b="1" dirty="0"/>
-              <a:t>O(n)</a:t>
-            </a:r>
-            <a:r>
-              <a:rPr lang="en-US" sz="2800" dirty="0"/>
-              <a:t>.</a:t>
-            </a:r>
-          </a:p>
-          <a:p>
-            <a:pPr marL="0" indent="0">
-              <a:buNone/>
-            </a:pPr>
-            <a:endParaRPr lang="en-US" sz="2800" dirty="0"/>
-          </a:p>
-          <a:p>
-            <a:pPr marL="0" indent="0">
-              <a:buNone/>
-            </a:pPr>
-            <a:r>
-              <a:rPr lang="en-US" sz="2800" dirty="0">
-                <a:latin typeface="Courier New" panose="02070309020205020404" pitchFamily="49" charset="0"/>
-                <a:cs typeface="Courier New" panose="02070309020205020404" pitchFamily="49" charset="0"/>
-              </a:rPr>
-              <a:t>public int[] </a:t>
-            </a:r>
-            <a:r>
-              <a:rPr lang="en-US" sz="2800" dirty="0" err="1">
-                <a:latin typeface="Courier New" panose="02070309020205020404" pitchFamily="49" charset="0"/>
-                <a:cs typeface="Courier New" panose="02070309020205020404" pitchFamily="49" charset="0"/>
-              </a:rPr>
-              <a:t>createIndexArray</a:t>
-            </a:r>
-            <a:r>
-              <a:rPr lang="en-US" sz="2800" dirty="0">
-                <a:latin typeface="Courier New" panose="02070309020205020404" pitchFamily="49" charset="0"/>
-                <a:cs typeface="Courier New" panose="02070309020205020404" pitchFamily="49" charset="0"/>
-              </a:rPr>
-              <a:t>(int n) {</a:t>
-            </a:r>
-            <a:br>
-              <a:rPr lang="en-US" sz="2800" dirty="0">
-                <a:latin typeface="Courier New" panose="02070309020205020404" pitchFamily="49" charset="0"/>
-                <a:cs typeface="Courier New" panose="02070309020205020404" pitchFamily="49" charset="0"/>
-              </a:rPr>
-            </a:br>
-            <a:r>
-              <a:rPr lang="en-US" sz="2800" dirty="0">
-                <a:latin typeface="Courier New" panose="02070309020205020404" pitchFamily="49" charset="0"/>
-                <a:cs typeface="Courier New" panose="02070309020205020404" pitchFamily="49" charset="0"/>
-              </a:rPr>
-              <a:t>	int[] </a:t>
-            </a:r>
-            <a:r>
-              <a:rPr lang="en-US" sz="2800" dirty="0" err="1">
-                <a:latin typeface="Courier New" panose="02070309020205020404" pitchFamily="49" charset="0"/>
-                <a:cs typeface="Courier New" panose="02070309020205020404" pitchFamily="49" charset="0"/>
-              </a:rPr>
-              <a:t>arr</a:t>
-            </a:r>
-            <a:r>
-              <a:rPr lang="en-US" sz="2800" dirty="0">
-                <a:latin typeface="Courier New" panose="02070309020205020404" pitchFamily="49" charset="0"/>
-                <a:cs typeface="Courier New" panose="02070309020205020404" pitchFamily="49" charset="0"/>
-              </a:rPr>
-              <a:t> = new int[n];</a:t>
-            </a:r>
-            <a:br>
-              <a:rPr lang="en-US" sz="2800" dirty="0">
-                <a:latin typeface="Courier New" panose="02070309020205020404" pitchFamily="49" charset="0"/>
-                <a:cs typeface="Courier New" panose="02070309020205020404" pitchFamily="49" charset="0"/>
-              </a:rPr>
-            </a:br>
-            <a:r>
-              <a:rPr lang="en-US" sz="2800" dirty="0">
-                <a:latin typeface="Courier New" panose="02070309020205020404" pitchFamily="49" charset="0"/>
-                <a:cs typeface="Courier New" panose="02070309020205020404" pitchFamily="49" charset="0"/>
-              </a:rPr>
-              <a:t>	for (int </a:t>
-            </a:r>
-            <a:r>
-              <a:rPr lang="en-US" sz="2800" dirty="0" err="1">
-                <a:latin typeface="Courier New" panose="02070309020205020404" pitchFamily="49" charset="0"/>
-                <a:cs typeface="Courier New" panose="02070309020205020404" pitchFamily="49" charset="0"/>
-              </a:rPr>
-              <a:t>i</a:t>
-            </a:r>
-            <a:r>
-              <a:rPr lang="en-US" sz="2800" dirty="0">
-                <a:latin typeface="Courier New" panose="02070309020205020404" pitchFamily="49" charset="0"/>
-                <a:cs typeface="Courier New" panose="02070309020205020404" pitchFamily="49" charset="0"/>
-              </a:rPr>
-              <a:t> = 0; </a:t>
-            </a:r>
-            <a:r>
-              <a:rPr lang="en-US" sz="2800" dirty="0" err="1">
-                <a:latin typeface="Courier New" panose="02070309020205020404" pitchFamily="49" charset="0"/>
-                <a:cs typeface="Courier New" panose="02070309020205020404" pitchFamily="49" charset="0"/>
-              </a:rPr>
-              <a:t>i</a:t>
-            </a:r>
-            <a:r>
-              <a:rPr lang="en-US" sz="2800" dirty="0">
-                <a:latin typeface="Courier New" panose="02070309020205020404" pitchFamily="49" charset="0"/>
-                <a:cs typeface="Courier New" panose="02070309020205020404" pitchFamily="49" charset="0"/>
-              </a:rPr>
-              <a:t> &lt; n; </a:t>
-            </a:r>
-            <a:r>
-              <a:rPr lang="en-US" sz="2800" dirty="0" err="1">
-                <a:latin typeface="Courier New" panose="02070309020205020404" pitchFamily="49" charset="0"/>
-                <a:cs typeface="Courier New" panose="02070309020205020404" pitchFamily="49" charset="0"/>
-              </a:rPr>
-              <a:t>i</a:t>
-            </a:r>
-            <a:r>
-              <a:rPr lang="en-US" sz="2800" dirty="0">
-                <a:latin typeface="Courier New" panose="02070309020205020404" pitchFamily="49" charset="0"/>
-                <a:cs typeface="Courier New" panose="02070309020205020404" pitchFamily="49" charset="0"/>
-              </a:rPr>
-              <a:t>++) </a:t>
-            </a:r>
-            <a:r>
-              <a:rPr lang="en-US" sz="2800" dirty="0" err="1">
-                <a:latin typeface="Courier New" panose="02070309020205020404" pitchFamily="49" charset="0"/>
-                <a:cs typeface="Courier New" panose="02070309020205020404" pitchFamily="49" charset="0"/>
-              </a:rPr>
-              <a:t>arr</a:t>
-            </a:r>
-            <a:r>
-              <a:rPr lang="en-US" sz="2800" dirty="0">
-                <a:latin typeface="Courier New" panose="02070309020205020404" pitchFamily="49" charset="0"/>
-                <a:cs typeface="Courier New" panose="02070309020205020404" pitchFamily="49" charset="0"/>
-              </a:rPr>
-              <a:t>[</a:t>
-            </a:r>
-            <a:r>
-              <a:rPr lang="en-US" sz="2800" dirty="0" err="1">
-                <a:latin typeface="Courier New" panose="02070309020205020404" pitchFamily="49" charset="0"/>
-                <a:cs typeface="Courier New" panose="02070309020205020404" pitchFamily="49" charset="0"/>
-              </a:rPr>
-              <a:t>i</a:t>
-            </a:r>
-            <a:r>
-              <a:rPr lang="en-US" sz="2800" dirty="0">
-                <a:latin typeface="Courier New" panose="02070309020205020404" pitchFamily="49" charset="0"/>
-                <a:cs typeface="Courier New" panose="02070309020205020404" pitchFamily="49" charset="0"/>
-              </a:rPr>
-              <a:t>] = </a:t>
-            </a:r>
-            <a:r>
-              <a:rPr lang="en-US" sz="2800" dirty="0" err="1">
-                <a:latin typeface="Courier New" panose="02070309020205020404" pitchFamily="49" charset="0"/>
-                <a:cs typeface="Courier New" panose="02070309020205020404" pitchFamily="49" charset="0"/>
-              </a:rPr>
-              <a:t>i</a:t>
-            </a:r>
-            <a:r>
-              <a:rPr lang="en-US" sz="2800" dirty="0">
-                <a:latin typeface="Courier New" panose="02070309020205020404" pitchFamily="49" charset="0"/>
-                <a:cs typeface="Courier New" panose="02070309020205020404" pitchFamily="49" charset="0"/>
-              </a:rPr>
-              <a:t>;</a:t>
-            </a:r>
-            <a:br>
-              <a:rPr lang="en-US" sz="2800" dirty="0">
-                <a:latin typeface="Courier New" panose="02070309020205020404" pitchFamily="49" charset="0"/>
-                <a:cs typeface="Courier New" panose="02070309020205020404" pitchFamily="49" charset="0"/>
-              </a:rPr>
-            </a:br>
-            <a:r>
-              <a:rPr lang="en-US" sz="2800" dirty="0">
-                <a:latin typeface="Courier New" panose="02070309020205020404" pitchFamily="49" charset="0"/>
-                <a:cs typeface="Courier New" panose="02070309020205020404" pitchFamily="49" charset="0"/>
-              </a:rPr>
-              <a:t>	return </a:t>
-            </a:r>
-            <a:r>
-              <a:rPr lang="en-US" sz="2800" dirty="0" err="1">
-                <a:latin typeface="Courier New" panose="02070309020205020404" pitchFamily="49" charset="0"/>
-                <a:cs typeface="Courier New" panose="02070309020205020404" pitchFamily="49" charset="0"/>
-              </a:rPr>
-              <a:t>arr</a:t>
-            </a:r>
-            <a:r>
-              <a:rPr lang="en-US" sz="2800" dirty="0">
-                <a:latin typeface="Courier New" panose="02070309020205020404" pitchFamily="49" charset="0"/>
-                <a:cs typeface="Courier New" panose="02070309020205020404" pitchFamily="49" charset="0"/>
-              </a:rPr>
-              <a:t>;</a:t>
-            </a:r>
-            <a:br>
-              <a:rPr lang="en-US" sz="2800" dirty="0">
-                <a:latin typeface="Courier New" panose="02070309020205020404" pitchFamily="49" charset="0"/>
-                <a:cs typeface="Courier New" panose="02070309020205020404" pitchFamily="49" charset="0"/>
-              </a:rPr>
-            </a:br>
-            <a:r>
-              <a:rPr lang="en-US" sz="2800" dirty="0">
-                <a:latin typeface="Courier New" panose="02070309020205020404" pitchFamily="49" charset="0"/>
-                <a:cs typeface="Courier New" panose="02070309020205020404" pitchFamily="49" charset="0"/>
-              </a:rPr>
-              <a:t>}</a:t>
-            </a:r>
-          </a:p>
-        </p:txBody>
-      </p:sp>
-    </p:spTree>
-    <p:extLst>
-      <p:ext uri="{BB962C8B-B14F-4D97-AF65-F5344CB8AC3E}">
-        <p14:creationId xmlns:p14="http://schemas.microsoft.com/office/powerpoint/2010/main" val="2104516552"/>
-      </p:ext>
-    </p:extLst>
-  </p:cSld>
-  <p:clrMapOvr>
-    <a:masterClrMapping/>
-  </p:clrMapOvr>
-</p:sld>
-</file>
-
-<file path=ppt/slides/slide14.xml><?xml version="1.0" encoding="utf-8"?>
-<p:sld xmlns:a="http://schemas.openxmlformats.org/drawingml/2006/main" xmlns:r="http://schemas.openxmlformats.org/officeDocument/2006/relationships" xmlns:p="http://schemas.openxmlformats.org/presentationml/2006/main">
-  <p:cSld>
-    <p:spTree>
-      <p:nvGrpSpPr>
-        <p:cNvPr id="1" name=""/>
-        <p:cNvGrpSpPr/>
-        <p:nvPr/>
-      </p:nvGrpSpPr>
-      <p:grpSpPr>
-        <a:xfrm>
-          <a:off x="0" y="0"/>
-          <a:ext cx="0" cy="0"/>
-          <a:chOff x="0" y="0"/>
-          <a:chExt cx="0" cy="0"/>
-        </a:xfrm>
-      </p:grpSpPr>
-      <p:sp>
-        <p:nvSpPr>
-          <p:cNvPr id="2" name="Title 1">
-            <a:extLst>
-              <a:ext uri="{FF2B5EF4-FFF2-40B4-BE49-F238E27FC236}">
-                <a16:creationId xmlns:a16="http://schemas.microsoft.com/office/drawing/2014/main" id="{0A42B16F-5F0B-4F17-BB30-400779CD6C25}"/>
-              </a:ext>
-            </a:extLst>
-          </p:cNvPr>
-          <p:cNvSpPr>
-            <a:spLocks noGrp="1"/>
-          </p:cNvSpPr>
-          <p:nvPr>
-            <p:ph type="title"/>
-          </p:nvPr>
-        </p:nvSpPr>
-        <p:spPr/>
-        <p:txBody>
-          <a:bodyPr anchor="t"/>
-          <a:lstStyle/>
-          <a:p>
-            <a:r>
-              <a:rPr lang="en-US" dirty="0"/>
               <a:t>“Big O” notation: Sorting</a:t>
             </a:r>
           </a:p>
@@ -14304,7 +14230,7 @@
 </p:sld>
 </file>
 
-<file path=ppt/slides/slide15.xml><?xml version="1.0" encoding="utf-8"?>
+<file path=ppt/slides/slide14.xml><?xml version="1.0" encoding="utf-8"?>
 <p:sld xmlns:a="http://schemas.openxmlformats.org/drawingml/2006/main" xmlns:r="http://schemas.openxmlformats.org/officeDocument/2006/relationships" xmlns:p="http://schemas.openxmlformats.org/presentationml/2006/main">
   <p:cSld>
     <p:spTree>
@@ -15150,7 +15076,7 @@
 </p:sld>
 </file>
 
-<file path=ppt/slides/slide16.xml><?xml version="1.0" encoding="utf-8"?>
+<file path=ppt/slides/slide15.xml><?xml version="1.0" encoding="utf-8"?>
 <p:sld xmlns:a="http://schemas.openxmlformats.org/drawingml/2006/main" xmlns:r="http://schemas.openxmlformats.org/officeDocument/2006/relationships" xmlns:p="http://schemas.openxmlformats.org/presentationml/2006/main">
   <p:cSld>
     <p:spTree>
@@ -17313,7 +17239,7 @@
 </p:sld>
 </file>
 
-<file path=ppt/slides/slide17.xml><?xml version="1.0" encoding="utf-8"?>
+<file path=ppt/slides/slide16.xml><?xml version="1.0" encoding="utf-8"?>
 <p:sld xmlns:a="http://schemas.openxmlformats.org/drawingml/2006/main" xmlns:r="http://schemas.openxmlformats.org/officeDocument/2006/relationships" xmlns:p="http://schemas.openxmlformats.org/presentationml/2006/main">
   <p:cSld>
     <p:spTree>
@@ -17550,7 +17476,7 @@
 </p:sld>
 </file>
 
-<file path=ppt/slides/slide18.xml><?xml version="1.0" encoding="utf-8"?>
+<file path=ppt/slides/slide17.xml><?xml version="1.0" encoding="utf-8"?>
 <p:sld xmlns:a="http://schemas.openxmlformats.org/drawingml/2006/main" xmlns:r="http://schemas.openxmlformats.org/officeDocument/2006/relationships" xmlns:p="http://schemas.openxmlformats.org/presentationml/2006/main">
   <p:cSld>
     <p:spTree>
@@ -17721,7 +17647,7 @@
 </p:sld>
 </file>
 
-<file path=ppt/slides/slide19.xml><?xml version="1.0" encoding="utf-8"?>
+<file path=ppt/slides/slide18.xml><?xml version="1.0" encoding="utf-8"?>
 <p:sld xmlns:a="http://schemas.openxmlformats.org/drawingml/2006/main" xmlns:r="http://schemas.openxmlformats.org/officeDocument/2006/relationships" xmlns:p="http://schemas.openxmlformats.org/presentationml/2006/main">
   <p:cSld>
     <p:spTree>
@@ -17778,6 +17704,250 @@
     <p:extLst>
       <p:ext uri="{BB962C8B-B14F-4D97-AF65-F5344CB8AC3E}">
         <p14:creationId xmlns:p14="http://schemas.microsoft.com/office/powerpoint/2010/main" val="3163252657"/>
+      </p:ext>
+    </p:extLst>
+  </p:cSld>
+  <p:clrMapOvr>
+    <a:masterClrMapping/>
+  </p:clrMapOvr>
+</p:sld>
+</file>
+
+<file path=ppt/slides/slide19.xml><?xml version="1.0" encoding="utf-8"?>
+<p:sld xmlns:a="http://schemas.openxmlformats.org/drawingml/2006/main" xmlns:r="http://schemas.openxmlformats.org/officeDocument/2006/relationships" xmlns:p="http://schemas.openxmlformats.org/presentationml/2006/main">
+  <p:cSld>
+    <p:spTree>
+      <p:nvGrpSpPr>
+        <p:cNvPr id="1" name=""/>
+        <p:cNvGrpSpPr/>
+        <p:nvPr/>
+      </p:nvGrpSpPr>
+      <p:grpSpPr>
+        <a:xfrm>
+          <a:off x="0" y="0"/>
+          <a:ext cx="0" cy="0"/>
+          <a:chOff x="0" y="0"/>
+          <a:chExt cx="0" cy="0"/>
+        </a:xfrm>
+      </p:grpSpPr>
+      <p:sp>
+        <p:nvSpPr>
+          <p:cNvPr id="2" name="Title 1">
+            <a:extLst>
+              <a:ext uri="{FF2B5EF4-FFF2-40B4-BE49-F238E27FC236}">
+                <a16:creationId xmlns:a16="http://schemas.microsoft.com/office/drawing/2014/main" id="{811B27AE-23B4-4897-8D2F-709050B5C45B}"/>
+              </a:ext>
+            </a:extLst>
+          </p:cNvPr>
+          <p:cNvSpPr>
+            <a:spLocks noGrp="1"/>
+          </p:cNvSpPr>
+          <p:nvPr>
+            <p:ph type="title"/>
+          </p:nvPr>
+        </p:nvSpPr>
+        <p:spPr/>
+        <p:txBody>
+          <a:bodyPr anchor="t"/>
+          <a:lstStyle/>
+          <a:p>
+            <a:r>
+              <a:rPr lang="en-US" dirty="0"/>
+              <a:t>How would you solve…?  Triplets</a:t>
+            </a:r>
+          </a:p>
+        </p:txBody>
+      </p:sp>
+      <p:sp>
+        <p:nvSpPr>
+          <p:cNvPr id="3" name="Content Placeholder 2">
+            <a:extLst>
+              <a:ext uri="{FF2B5EF4-FFF2-40B4-BE49-F238E27FC236}">
+                <a16:creationId xmlns:a16="http://schemas.microsoft.com/office/drawing/2014/main" id="{28199AAA-01AF-4551-B410-CA2297F85B28}"/>
+              </a:ext>
+            </a:extLst>
+          </p:cNvPr>
+          <p:cNvSpPr>
+            <a:spLocks noGrp="1"/>
+          </p:cNvSpPr>
+          <p:nvPr>
+            <p:ph idx="1"/>
+          </p:nvPr>
+        </p:nvSpPr>
+        <p:spPr>
+          <a:xfrm>
+            <a:off x="685801" y="1337733"/>
+            <a:ext cx="10436901" cy="5091202"/>
+          </a:xfrm>
+        </p:spPr>
+        <p:txBody>
+          <a:bodyPr anchor="t">
+            <a:noAutofit/>
+          </a:bodyPr>
+          <a:lstStyle/>
+          <a:p>
+            <a:pPr marL="0" indent="0">
+              <a:buNone/>
+            </a:pPr>
+            <a:r>
+              <a:rPr lang="en-US" sz="2800" dirty="0"/>
+              <a:t>Given an array of </a:t>
+            </a:r>
+            <a:r>
+              <a:rPr lang="en-US" sz="2800" dirty="0" err="1"/>
+              <a:t>ints</a:t>
+            </a:r>
+            <a:r>
+              <a:rPr lang="en-US" sz="2800" dirty="0"/>
+              <a:t> (32-bit integers).</a:t>
+            </a:r>
+          </a:p>
+          <a:p>
+            <a:pPr marL="0" indent="0">
+              <a:buNone/>
+            </a:pPr>
+            <a:r>
+              <a:rPr lang="en-US" sz="2800" dirty="0"/>
+              <a:t>Find all triplets that add up to zero, and return as a list.</a:t>
+            </a:r>
+          </a:p>
+          <a:p>
+            <a:pPr marL="0" indent="0">
+              <a:buNone/>
+            </a:pPr>
+            <a:endParaRPr lang="en-US" sz="2800" dirty="0"/>
+          </a:p>
+          <a:p>
+            <a:pPr marL="0" indent="0">
+              <a:buNone/>
+            </a:pPr>
+            <a:r>
+              <a:rPr lang="en-US" sz="2800" dirty="0"/>
+              <a:t>e.g. </a:t>
+            </a:r>
+            <a:r>
+              <a:rPr lang="en-US" sz="2800" dirty="0" err="1"/>
+              <a:t>nums</a:t>
+            </a:r>
+            <a:r>
+              <a:rPr lang="en-US" sz="2800" dirty="0"/>
+              <a:t> = [-1, 0, 1, 2, -1, 4] </a:t>
+            </a:r>
+            <a:r>
+              <a:rPr lang="en-US" sz="2800" dirty="0">
+                <a:sym typeface="Wingdings" panose="05000000000000000000" pitchFamily="2" charset="2"/>
+              </a:rPr>
+              <a:t> </a:t>
+            </a:r>
+            <a:r>
+              <a:rPr lang="en-US" sz="2800" dirty="0"/>
+              <a:t>return [-1, 0, 1] and [-1, 2, -1]</a:t>
+            </a:r>
+          </a:p>
+          <a:p>
+            <a:pPr marL="0" indent="0">
+              <a:buNone/>
+            </a:pPr>
+            <a:endParaRPr lang="en-US" sz="2800" dirty="0"/>
+          </a:p>
+          <a:p>
+            <a:pPr marL="0" indent="0">
+              <a:buNone/>
+            </a:pPr>
+            <a:r>
+              <a:rPr lang="en-US" sz="2400" dirty="0">
+                <a:latin typeface="Courier New" panose="02070309020205020404" pitchFamily="49" charset="0"/>
+                <a:cs typeface="Courier New" panose="02070309020205020404" pitchFamily="49" charset="0"/>
+              </a:rPr>
+              <a:t>class Foo {</a:t>
+            </a:r>
+            <a:br>
+              <a:rPr lang="en-US" sz="2400" dirty="0">
+                <a:latin typeface="Courier New" panose="02070309020205020404" pitchFamily="49" charset="0"/>
+                <a:cs typeface="Courier New" panose="02070309020205020404" pitchFamily="49" charset="0"/>
+              </a:rPr>
+            </a:br>
+            <a:r>
+              <a:rPr lang="en-US" sz="2400" dirty="0">
+                <a:latin typeface="Courier New" panose="02070309020205020404" pitchFamily="49" charset="0"/>
+                <a:cs typeface="Courier New" panose="02070309020205020404" pitchFamily="49" charset="0"/>
+              </a:rPr>
+              <a:t>	public List&lt;List&lt;Integer&gt;&gt; </a:t>
+            </a:r>
+            <a:r>
+              <a:rPr lang="en-US" sz="2400" dirty="0" err="1">
+                <a:latin typeface="Courier New" panose="02070309020205020404" pitchFamily="49" charset="0"/>
+                <a:cs typeface="Courier New" panose="02070309020205020404" pitchFamily="49" charset="0"/>
+              </a:rPr>
+              <a:t>getTriplets</a:t>
+            </a:r>
+            <a:r>
+              <a:rPr lang="en-US" sz="2400" dirty="0">
+                <a:latin typeface="Courier New" panose="02070309020205020404" pitchFamily="49" charset="0"/>
+                <a:cs typeface="Courier New" panose="02070309020205020404" pitchFamily="49" charset="0"/>
+              </a:rPr>
+              <a:t>(int[] </a:t>
+            </a:r>
+            <a:r>
+              <a:rPr lang="en-US" sz="2400" dirty="0" err="1">
+                <a:latin typeface="Courier New" panose="02070309020205020404" pitchFamily="49" charset="0"/>
+                <a:cs typeface="Courier New" panose="02070309020205020404" pitchFamily="49" charset="0"/>
+              </a:rPr>
+              <a:t>nums</a:t>
+            </a:r>
+            <a:r>
+              <a:rPr lang="en-US" sz="2400" dirty="0">
+                <a:latin typeface="Courier New" panose="02070309020205020404" pitchFamily="49" charset="0"/>
+                <a:cs typeface="Courier New" panose="02070309020205020404" pitchFamily="49" charset="0"/>
+              </a:rPr>
+              <a:t>) {</a:t>
+            </a:r>
+            <a:br>
+              <a:rPr lang="en-US" sz="2400" dirty="0">
+                <a:latin typeface="Courier New" panose="02070309020205020404" pitchFamily="49" charset="0"/>
+                <a:cs typeface="Courier New" panose="02070309020205020404" pitchFamily="49" charset="0"/>
+              </a:rPr>
+            </a:br>
+            <a:r>
+              <a:rPr lang="en-US" sz="2400" dirty="0">
+                <a:latin typeface="Courier New" panose="02070309020205020404" pitchFamily="49" charset="0"/>
+                <a:cs typeface="Courier New" panose="02070309020205020404" pitchFamily="49" charset="0"/>
+              </a:rPr>
+              <a:t>		// TODO</a:t>
+            </a:r>
+            <a:br>
+              <a:rPr lang="en-US" sz="2400" dirty="0">
+                <a:latin typeface="Courier New" panose="02070309020205020404" pitchFamily="49" charset="0"/>
+                <a:cs typeface="Courier New" panose="02070309020205020404" pitchFamily="49" charset="0"/>
+              </a:rPr>
+            </a:br>
+            <a:r>
+              <a:rPr lang="en-US" sz="2400" dirty="0">
+                <a:latin typeface="Courier New" panose="02070309020205020404" pitchFamily="49" charset="0"/>
+                <a:cs typeface="Courier New" panose="02070309020205020404" pitchFamily="49" charset="0"/>
+              </a:rPr>
+              <a:t>	}</a:t>
+            </a:r>
+            <a:br>
+              <a:rPr lang="en-US" sz="2400" dirty="0">
+                <a:latin typeface="Courier New" panose="02070309020205020404" pitchFamily="49" charset="0"/>
+                <a:cs typeface="Courier New" panose="02070309020205020404" pitchFamily="49" charset="0"/>
+              </a:rPr>
+            </a:br>
+            <a:r>
+              <a:rPr lang="en-US" sz="2400" dirty="0">
+                <a:latin typeface="Courier New" panose="02070309020205020404" pitchFamily="49" charset="0"/>
+                <a:cs typeface="Courier New" panose="02070309020205020404" pitchFamily="49" charset="0"/>
+              </a:rPr>
+              <a:t>}</a:t>
+            </a:r>
+          </a:p>
+        </p:txBody>
+      </p:sp>
+    </p:spTree>
+    <p:extLst>
+      <p:ext uri="{BB962C8B-B14F-4D97-AF65-F5344CB8AC3E}">
+        <p14:creationId xmlns:p14="http://schemas.microsoft.com/office/powerpoint/2010/main" val="1329900618"/>
       </p:ext>
     </p:extLst>
   </p:cSld>
@@ -18378,250 +18548,6 @@
           <a:p>
             <a:r>
               <a:rPr lang="en-US" dirty="0"/>
-              <a:t>How would you solve…?  Triplets</a:t>
-            </a:r>
-          </a:p>
-        </p:txBody>
-      </p:sp>
-      <p:sp>
-        <p:nvSpPr>
-          <p:cNvPr id="3" name="Content Placeholder 2">
-            <a:extLst>
-              <a:ext uri="{FF2B5EF4-FFF2-40B4-BE49-F238E27FC236}">
-                <a16:creationId xmlns:a16="http://schemas.microsoft.com/office/drawing/2014/main" id="{28199AAA-01AF-4551-B410-CA2297F85B28}"/>
-              </a:ext>
-            </a:extLst>
-          </p:cNvPr>
-          <p:cNvSpPr>
-            <a:spLocks noGrp="1"/>
-          </p:cNvSpPr>
-          <p:nvPr>
-            <p:ph idx="1"/>
-          </p:nvPr>
-        </p:nvSpPr>
-        <p:spPr>
-          <a:xfrm>
-            <a:off x="685801" y="1337733"/>
-            <a:ext cx="10436901" cy="5091202"/>
-          </a:xfrm>
-        </p:spPr>
-        <p:txBody>
-          <a:bodyPr anchor="t">
-            <a:noAutofit/>
-          </a:bodyPr>
-          <a:lstStyle/>
-          <a:p>
-            <a:pPr marL="0" indent="0">
-              <a:buNone/>
-            </a:pPr>
-            <a:r>
-              <a:rPr lang="en-US" sz="2800" dirty="0"/>
-              <a:t>Given an array of </a:t>
-            </a:r>
-            <a:r>
-              <a:rPr lang="en-US" sz="2800" dirty="0" err="1"/>
-              <a:t>ints</a:t>
-            </a:r>
-            <a:r>
-              <a:rPr lang="en-US" sz="2800" dirty="0"/>
-              <a:t> (32-bit integers).</a:t>
-            </a:r>
-          </a:p>
-          <a:p>
-            <a:pPr marL="0" indent="0">
-              <a:buNone/>
-            </a:pPr>
-            <a:r>
-              <a:rPr lang="en-US" sz="2800" dirty="0"/>
-              <a:t>Find all triplets that add up to zero, and return as a list.</a:t>
-            </a:r>
-          </a:p>
-          <a:p>
-            <a:pPr marL="0" indent="0">
-              <a:buNone/>
-            </a:pPr>
-            <a:endParaRPr lang="en-US" sz="2800" dirty="0"/>
-          </a:p>
-          <a:p>
-            <a:pPr marL="0" indent="0">
-              <a:buNone/>
-            </a:pPr>
-            <a:r>
-              <a:rPr lang="en-US" sz="2800" dirty="0"/>
-              <a:t>e.g. </a:t>
-            </a:r>
-            <a:r>
-              <a:rPr lang="en-US" sz="2800" dirty="0" err="1"/>
-              <a:t>nums</a:t>
-            </a:r>
-            <a:r>
-              <a:rPr lang="en-US" sz="2800" dirty="0"/>
-              <a:t> = [-1, 0, 1, 2, -1, 4] </a:t>
-            </a:r>
-            <a:r>
-              <a:rPr lang="en-US" sz="2800" dirty="0">
-                <a:sym typeface="Wingdings" panose="05000000000000000000" pitchFamily="2" charset="2"/>
-              </a:rPr>
-              <a:t> </a:t>
-            </a:r>
-            <a:r>
-              <a:rPr lang="en-US" sz="2800" dirty="0"/>
-              <a:t>return [-1, 0, 1] and [-1, 2, -1]</a:t>
-            </a:r>
-          </a:p>
-          <a:p>
-            <a:pPr marL="0" indent="0">
-              <a:buNone/>
-            </a:pPr>
-            <a:endParaRPr lang="en-US" sz="2800" dirty="0"/>
-          </a:p>
-          <a:p>
-            <a:pPr marL="0" indent="0">
-              <a:buNone/>
-            </a:pPr>
-            <a:r>
-              <a:rPr lang="en-US" sz="2400" dirty="0">
-                <a:latin typeface="Courier New" panose="02070309020205020404" pitchFamily="49" charset="0"/>
-                <a:cs typeface="Courier New" panose="02070309020205020404" pitchFamily="49" charset="0"/>
-              </a:rPr>
-              <a:t>class Foo {</a:t>
-            </a:r>
-            <a:br>
-              <a:rPr lang="en-US" sz="2400" dirty="0">
-                <a:latin typeface="Courier New" panose="02070309020205020404" pitchFamily="49" charset="0"/>
-                <a:cs typeface="Courier New" panose="02070309020205020404" pitchFamily="49" charset="0"/>
-              </a:rPr>
-            </a:br>
-            <a:r>
-              <a:rPr lang="en-US" sz="2400" dirty="0">
-                <a:latin typeface="Courier New" panose="02070309020205020404" pitchFamily="49" charset="0"/>
-                <a:cs typeface="Courier New" panose="02070309020205020404" pitchFamily="49" charset="0"/>
-              </a:rPr>
-              <a:t>	public List&lt;List&lt;Integer&gt;&gt; </a:t>
-            </a:r>
-            <a:r>
-              <a:rPr lang="en-US" sz="2400" dirty="0" err="1">
-                <a:latin typeface="Courier New" panose="02070309020205020404" pitchFamily="49" charset="0"/>
-                <a:cs typeface="Courier New" panose="02070309020205020404" pitchFamily="49" charset="0"/>
-              </a:rPr>
-              <a:t>getTriplets</a:t>
-            </a:r>
-            <a:r>
-              <a:rPr lang="en-US" sz="2400" dirty="0">
-                <a:latin typeface="Courier New" panose="02070309020205020404" pitchFamily="49" charset="0"/>
-                <a:cs typeface="Courier New" panose="02070309020205020404" pitchFamily="49" charset="0"/>
-              </a:rPr>
-              <a:t>(int[] </a:t>
-            </a:r>
-            <a:r>
-              <a:rPr lang="en-US" sz="2400" dirty="0" err="1">
-                <a:latin typeface="Courier New" panose="02070309020205020404" pitchFamily="49" charset="0"/>
-                <a:cs typeface="Courier New" panose="02070309020205020404" pitchFamily="49" charset="0"/>
-              </a:rPr>
-              <a:t>nums</a:t>
-            </a:r>
-            <a:r>
-              <a:rPr lang="en-US" sz="2400" dirty="0">
-                <a:latin typeface="Courier New" panose="02070309020205020404" pitchFamily="49" charset="0"/>
-                <a:cs typeface="Courier New" panose="02070309020205020404" pitchFamily="49" charset="0"/>
-              </a:rPr>
-              <a:t>) {</a:t>
-            </a:r>
-            <a:br>
-              <a:rPr lang="en-US" sz="2400" dirty="0">
-                <a:latin typeface="Courier New" panose="02070309020205020404" pitchFamily="49" charset="0"/>
-                <a:cs typeface="Courier New" panose="02070309020205020404" pitchFamily="49" charset="0"/>
-              </a:rPr>
-            </a:br>
-            <a:r>
-              <a:rPr lang="en-US" sz="2400" dirty="0">
-                <a:latin typeface="Courier New" panose="02070309020205020404" pitchFamily="49" charset="0"/>
-                <a:cs typeface="Courier New" panose="02070309020205020404" pitchFamily="49" charset="0"/>
-              </a:rPr>
-              <a:t>		// TODO</a:t>
-            </a:r>
-            <a:br>
-              <a:rPr lang="en-US" sz="2400" dirty="0">
-                <a:latin typeface="Courier New" panose="02070309020205020404" pitchFamily="49" charset="0"/>
-                <a:cs typeface="Courier New" panose="02070309020205020404" pitchFamily="49" charset="0"/>
-              </a:rPr>
-            </a:br>
-            <a:r>
-              <a:rPr lang="en-US" sz="2400" dirty="0">
-                <a:latin typeface="Courier New" panose="02070309020205020404" pitchFamily="49" charset="0"/>
-                <a:cs typeface="Courier New" panose="02070309020205020404" pitchFamily="49" charset="0"/>
-              </a:rPr>
-              <a:t>	}</a:t>
-            </a:r>
-            <a:br>
-              <a:rPr lang="en-US" sz="2400" dirty="0">
-                <a:latin typeface="Courier New" panose="02070309020205020404" pitchFamily="49" charset="0"/>
-                <a:cs typeface="Courier New" panose="02070309020205020404" pitchFamily="49" charset="0"/>
-              </a:rPr>
-            </a:br>
-            <a:r>
-              <a:rPr lang="en-US" sz="2400" dirty="0">
-                <a:latin typeface="Courier New" panose="02070309020205020404" pitchFamily="49" charset="0"/>
-                <a:cs typeface="Courier New" panose="02070309020205020404" pitchFamily="49" charset="0"/>
-              </a:rPr>
-              <a:t>}</a:t>
-            </a:r>
-          </a:p>
-        </p:txBody>
-      </p:sp>
-    </p:spTree>
-    <p:extLst>
-      <p:ext uri="{BB962C8B-B14F-4D97-AF65-F5344CB8AC3E}">
-        <p14:creationId xmlns:p14="http://schemas.microsoft.com/office/powerpoint/2010/main" val="1329900618"/>
-      </p:ext>
-    </p:extLst>
-  </p:cSld>
-  <p:clrMapOvr>
-    <a:masterClrMapping/>
-  </p:clrMapOvr>
-</p:sld>
-</file>
-
-<file path=ppt/slides/slide21.xml><?xml version="1.0" encoding="utf-8"?>
-<p:sld xmlns:a="http://schemas.openxmlformats.org/drawingml/2006/main" xmlns:r="http://schemas.openxmlformats.org/officeDocument/2006/relationships" xmlns:p="http://schemas.openxmlformats.org/presentationml/2006/main">
-  <p:cSld>
-    <p:spTree>
-      <p:nvGrpSpPr>
-        <p:cNvPr id="1" name=""/>
-        <p:cNvGrpSpPr/>
-        <p:nvPr/>
-      </p:nvGrpSpPr>
-      <p:grpSpPr>
-        <a:xfrm>
-          <a:off x="0" y="0"/>
-          <a:ext cx="0" cy="0"/>
-          <a:chOff x="0" y="0"/>
-          <a:chExt cx="0" cy="0"/>
-        </a:xfrm>
-      </p:grpSpPr>
-      <p:sp>
-        <p:nvSpPr>
-          <p:cNvPr id="2" name="Title 1">
-            <a:extLst>
-              <a:ext uri="{FF2B5EF4-FFF2-40B4-BE49-F238E27FC236}">
-                <a16:creationId xmlns:a16="http://schemas.microsoft.com/office/drawing/2014/main" id="{811B27AE-23B4-4897-8D2F-709050B5C45B}"/>
-              </a:ext>
-            </a:extLst>
-          </p:cNvPr>
-          <p:cNvSpPr>
-            <a:spLocks noGrp="1"/>
-          </p:cNvSpPr>
-          <p:nvPr>
-            <p:ph type="title"/>
-          </p:nvPr>
-        </p:nvSpPr>
-        <p:spPr/>
-        <p:txBody>
-          <a:bodyPr anchor="t"/>
-          <a:lstStyle/>
-          <a:p>
-            <a:r>
-              <a:rPr lang="en-US" dirty="0"/>
               <a:t>Triplets: Three Nested Loops</a:t>
             </a:r>
           </a:p>
@@ -19671,7 +19597,7 @@
 </p:sld>
 </file>
 
-<file path=ppt/slides/slide22.xml><?xml version="1.0" encoding="utf-8"?>
+<file path=ppt/slides/slide21.xml><?xml version="1.0" encoding="utf-8"?>
 <p:sld xmlns:a="http://schemas.openxmlformats.org/drawingml/2006/main" xmlns:r="http://schemas.openxmlformats.org/officeDocument/2006/relationships" xmlns:p="http://schemas.openxmlformats.org/presentationml/2006/main">
   <p:cSld>
     <p:spTree>
@@ -19793,7 +19719,7 @@
 </p:sld>
 </file>
 
-<file path=ppt/slides/slide23.xml><?xml version="1.0" encoding="utf-8"?>
+<file path=ppt/slides/slide22.xml><?xml version="1.0" encoding="utf-8"?>
 <p:sld xmlns:a="http://schemas.openxmlformats.org/drawingml/2006/main" xmlns:r="http://schemas.openxmlformats.org/officeDocument/2006/relationships" xmlns:p="http://schemas.openxmlformats.org/presentationml/2006/main">
   <p:cSld>
     <p:spTree>
@@ -20960,7 +20886,7 @@
 </p:sld>
 </file>
 
-<file path=ppt/slides/slide24.xml><?xml version="1.0" encoding="utf-8"?>
+<file path=ppt/slides/slide23.xml><?xml version="1.0" encoding="utf-8"?>
 <p:sld xmlns:a="http://schemas.openxmlformats.org/drawingml/2006/main" xmlns:r="http://schemas.openxmlformats.org/officeDocument/2006/relationships" xmlns:p="http://schemas.openxmlformats.org/presentationml/2006/main">
   <p:cSld>
     <p:spTree>
@@ -21740,7 +21666,7 @@
 </p:sld>
 </file>
 
-<file path=ppt/slides/slide25.xml><?xml version="1.0" encoding="utf-8"?>
+<file path=ppt/slides/slide24.xml><?xml version="1.0" encoding="utf-8"?>
 <p:sld xmlns:a="http://schemas.openxmlformats.org/drawingml/2006/main" xmlns:r="http://schemas.openxmlformats.org/officeDocument/2006/relationships" xmlns:p="http://schemas.openxmlformats.org/presentationml/2006/main">
   <p:cSld>
     <p:spTree>
@@ -21980,7 +21906,7 @@
 </p:sld>
 </file>
 
-<file path=ppt/slides/slide26.xml><?xml version="1.0" encoding="utf-8"?>
+<file path=ppt/slides/slide25.xml><?xml version="1.0" encoding="utf-8"?>
 <p:sld xmlns:a="http://schemas.openxmlformats.org/drawingml/2006/main" xmlns:r="http://schemas.openxmlformats.org/officeDocument/2006/relationships" xmlns:p="http://schemas.openxmlformats.org/presentationml/2006/main">
   <p:cSld>
     <p:spTree>
@@ -22636,7 +22562,7 @@
 </p:sld>
 </file>
 
-<file path=ppt/slides/slide27.xml><?xml version="1.0" encoding="utf-8"?>
+<file path=ppt/slides/slide26.xml><?xml version="1.0" encoding="utf-8"?>
 <p:sld xmlns:a="http://schemas.openxmlformats.org/drawingml/2006/main" xmlns:r="http://schemas.openxmlformats.org/officeDocument/2006/relationships" xmlns:p="http://schemas.openxmlformats.org/presentationml/2006/main">
   <p:cSld>
     <p:spTree>
@@ -23189,7 +23115,7 @@
 </p:sld>
 </file>
 
-<file path=ppt/slides/slide28.xml><?xml version="1.0" encoding="utf-8"?>
+<file path=ppt/slides/slide27.xml><?xml version="1.0" encoding="utf-8"?>
 <p:sld xmlns:a="http://schemas.openxmlformats.org/drawingml/2006/main" xmlns:r="http://schemas.openxmlformats.org/officeDocument/2006/relationships" xmlns:p="http://schemas.openxmlformats.org/presentationml/2006/main">
   <p:cSld>
     <p:spTree>
@@ -23506,7 +23432,7 @@
 </p:sld>
 </file>
 
-<file path=ppt/slides/slide29.xml><?xml version="1.0" encoding="utf-8"?>
+<file path=ppt/slides/slide28.xml><?xml version="1.0" encoding="utf-8"?>
 <p:sld xmlns:a="http://schemas.openxmlformats.org/drawingml/2006/main" xmlns:r="http://schemas.openxmlformats.org/officeDocument/2006/relationships" xmlns:p="http://schemas.openxmlformats.org/presentationml/2006/main">
   <p:cSld>
     <p:spTree>
@@ -23934,95 +23860,7 @@
 </p:sld>
 </file>
 
-<file path=ppt/slides/slide3.xml><?xml version="1.0" encoding="utf-8"?>
-<p:sld xmlns:a="http://schemas.openxmlformats.org/drawingml/2006/main" xmlns:r="http://schemas.openxmlformats.org/officeDocument/2006/relationships" xmlns:p="http://schemas.openxmlformats.org/presentationml/2006/main">
-  <p:cSld>
-    <p:spTree>
-      <p:nvGrpSpPr>
-        <p:cNvPr id="1" name=""/>
-        <p:cNvGrpSpPr/>
-        <p:nvPr/>
-      </p:nvGrpSpPr>
-      <p:grpSpPr>
-        <a:xfrm>
-          <a:off x="0" y="0"/>
-          <a:ext cx="0" cy="0"/>
-          <a:chOff x="0" y="0"/>
-          <a:chExt cx="0" cy="0"/>
-        </a:xfrm>
-      </p:grpSpPr>
-      <p:sp>
-        <p:nvSpPr>
-          <p:cNvPr id="2" name="Title 1">
-            <a:extLst>
-              <a:ext uri="{FF2B5EF4-FFF2-40B4-BE49-F238E27FC236}">
-                <a16:creationId xmlns:a16="http://schemas.microsoft.com/office/drawing/2014/main" id="{740B9B10-8093-4608-BB45-91056BC899E5}"/>
-              </a:ext>
-            </a:extLst>
-          </p:cNvPr>
-          <p:cNvSpPr>
-            <a:spLocks noGrp="1"/>
-          </p:cNvSpPr>
-          <p:nvPr>
-            <p:ph type="title"/>
-          </p:nvPr>
-        </p:nvSpPr>
-        <p:spPr/>
-        <p:txBody>
-          <a:bodyPr/>
-          <a:lstStyle/>
-          <a:p>
-            <a:r>
-              <a:rPr lang="en-US" dirty="0"/>
-              <a:t>Introduction (to do)</a:t>
-            </a:r>
-          </a:p>
-        </p:txBody>
-      </p:sp>
-      <p:sp>
-        <p:nvSpPr>
-          <p:cNvPr id="3" name="Content Placeholder 2">
-            <a:extLst>
-              <a:ext uri="{FF2B5EF4-FFF2-40B4-BE49-F238E27FC236}">
-                <a16:creationId xmlns:a16="http://schemas.microsoft.com/office/drawing/2014/main" id="{E02C06E3-E34F-45B8-995C-15207D89B99F}"/>
-              </a:ext>
-            </a:extLst>
-          </p:cNvPr>
-          <p:cNvSpPr>
-            <a:spLocks noGrp="1"/>
-          </p:cNvSpPr>
-          <p:nvPr>
-            <p:ph idx="1"/>
-          </p:nvPr>
-        </p:nvSpPr>
-        <p:spPr/>
-        <p:txBody>
-          <a:bodyPr anchor="t">
-            <a:normAutofit/>
-          </a:bodyPr>
-          <a:lstStyle/>
-          <a:p>
-            <a:r>
-              <a:rPr lang="en-US" sz="2800" dirty="0"/>
-              <a:t>About Manifest Solutions</a:t>
-            </a:r>
-          </a:p>
-        </p:txBody>
-      </p:sp>
-    </p:spTree>
-    <p:extLst>
-      <p:ext uri="{BB962C8B-B14F-4D97-AF65-F5344CB8AC3E}">
-        <p14:creationId xmlns:p14="http://schemas.microsoft.com/office/powerpoint/2010/main" val="2376152516"/>
-      </p:ext>
-    </p:extLst>
-  </p:cSld>
-  <p:clrMapOvr>
-    <a:masterClrMapping/>
-  </p:clrMapOvr>
-</p:sld>
-</file>
-
-<file path=ppt/slides/slide30.xml><?xml version="1.0" encoding="utf-8"?>
+<file path=ppt/slides/slide29.xml><?xml version="1.0" encoding="utf-8"?>
 <p:sld xmlns:a="http://schemas.openxmlformats.org/drawingml/2006/main" xmlns:r="http://schemas.openxmlformats.org/officeDocument/2006/relationships" xmlns:p="http://schemas.openxmlformats.org/presentationml/2006/main">
   <p:cSld>
     <p:spTree>
@@ -25125,7 +24963,119 @@
 </p:sld>
 </file>
 
-<file path=ppt/slides/slide31.xml><?xml version="1.0" encoding="utf-8"?>
+<file path=ppt/slides/slide3.xml><?xml version="1.0" encoding="utf-8"?>
+<p:sld xmlns:a="http://schemas.openxmlformats.org/drawingml/2006/main" xmlns:r="http://schemas.openxmlformats.org/officeDocument/2006/relationships" xmlns:p="http://schemas.openxmlformats.org/presentationml/2006/main">
+  <p:cSld>
+    <p:spTree>
+      <p:nvGrpSpPr>
+        <p:cNvPr id="1" name=""/>
+        <p:cNvGrpSpPr/>
+        <p:nvPr/>
+      </p:nvGrpSpPr>
+      <p:grpSpPr>
+        <a:xfrm>
+          <a:off x="0" y="0"/>
+          <a:ext cx="0" cy="0"/>
+          <a:chOff x="0" y="0"/>
+          <a:chExt cx="0" cy="0"/>
+        </a:xfrm>
+      </p:grpSpPr>
+      <p:sp>
+        <p:nvSpPr>
+          <p:cNvPr id="2" name="Title 1">
+            <a:extLst>
+              <a:ext uri="{FF2B5EF4-FFF2-40B4-BE49-F238E27FC236}">
+                <a16:creationId xmlns:a16="http://schemas.microsoft.com/office/drawing/2014/main" id="{740B9B10-8093-4608-BB45-91056BC899E5}"/>
+              </a:ext>
+            </a:extLst>
+          </p:cNvPr>
+          <p:cNvSpPr>
+            <a:spLocks noGrp="1"/>
+          </p:cNvSpPr>
+          <p:nvPr>
+            <p:ph type="title"/>
+          </p:nvPr>
+        </p:nvSpPr>
+        <p:spPr/>
+        <p:txBody>
+          <a:bodyPr/>
+          <a:lstStyle/>
+          <a:p>
+            <a:r>
+              <a:rPr lang="en-US" dirty="0"/>
+              <a:t>AGENDA</a:t>
+            </a:r>
+          </a:p>
+        </p:txBody>
+      </p:sp>
+      <p:sp>
+        <p:nvSpPr>
+          <p:cNvPr id="3" name="Content Placeholder 2">
+            <a:extLst>
+              <a:ext uri="{FF2B5EF4-FFF2-40B4-BE49-F238E27FC236}">
+                <a16:creationId xmlns:a16="http://schemas.microsoft.com/office/drawing/2014/main" id="{E02C06E3-E34F-45B8-995C-15207D89B99F}"/>
+              </a:ext>
+            </a:extLst>
+          </p:cNvPr>
+          <p:cNvSpPr>
+            <a:spLocks noGrp="1"/>
+          </p:cNvSpPr>
+          <p:nvPr>
+            <p:ph idx="1"/>
+          </p:nvPr>
+        </p:nvSpPr>
+        <p:spPr/>
+        <p:txBody>
+          <a:bodyPr anchor="t">
+            <a:normAutofit/>
+          </a:bodyPr>
+          <a:lstStyle/>
+          <a:p>
+            <a:r>
+              <a:rPr lang="en-US" sz="2800" dirty="0"/>
+              <a:t>Why did I start studying algorithms?</a:t>
+            </a:r>
+          </a:p>
+          <a:p>
+            <a:r>
+              <a:rPr lang="en-US" sz="2800" dirty="0"/>
+              <a:t>What makes a hard problem hard?</a:t>
+            </a:r>
+          </a:p>
+          <a:p>
+            <a:r>
+              <a:rPr lang="en-US" sz="2800" dirty="0"/>
+              <a:t>Comparing solutions using “big O” notation</a:t>
+            </a:r>
+          </a:p>
+          <a:p>
+            <a:r>
+              <a:rPr lang="en-US" sz="2800" dirty="0"/>
+              <a:t>Sample problems</a:t>
+            </a:r>
+          </a:p>
+          <a:p>
+            <a:r>
+              <a:rPr lang="en-US" sz="2800" dirty="0"/>
+              <a:t>How to practice and get better</a:t>
+            </a:r>
+          </a:p>
+        </p:txBody>
+      </p:sp>
+    </p:spTree>
+    <p:extLst>
+      <p:ext uri="{BB962C8B-B14F-4D97-AF65-F5344CB8AC3E}">
+        <p14:creationId xmlns:p14="http://schemas.microsoft.com/office/powerpoint/2010/main" val="3751573683"/>
+      </p:ext>
+    </p:extLst>
+  </p:cSld>
+  <p:clrMapOvr>
+    <a:masterClrMapping/>
+  </p:clrMapOvr>
+</p:sld>
+</file>
+
+<file path=ppt/slides/slide30.xml><?xml version="1.0" encoding="utf-8"?>
 <p:sld xmlns:a="http://schemas.openxmlformats.org/drawingml/2006/main" xmlns:r="http://schemas.openxmlformats.org/officeDocument/2006/relationships" xmlns:p="http://schemas.openxmlformats.org/presentationml/2006/main">
   <p:cSld>
     <p:spTree>
@@ -25406,7 +25356,7 @@
 </p:sld>
 </file>
 
-<file path=ppt/slides/slide32.xml><?xml version="1.0" encoding="utf-8"?>
+<file path=ppt/slides/slide31.xml><?xml version="1.0" encoding="utf-8"?>
 <p:sld xmlns:a="http://schemas.openxmlformats.org/drawingml/2006/main" xmlns:r="http://schemas.openxmlformats.org/officeDocument/2006/relationships" xmlns:p="http://schemas.openxmlformats.org/presentationml/2006/main">
   <p:cSld>
     <p:spTree>
@@ -25824,7 +25774,7 @@
 </p:sld>
 </file>
 
-<file path=ppt/slides/slide33.xml><?xml version="1.0" encoding="utf-8"?>
+<file path=ppt/slides/slide32.xml><?xml version="1.0" encoding="utf-8"?>
 <p:sld xmlns:a="http://schemas.openxmlformats.org/drawingml/2006/main" xmlns:r="http://schemas.openxmlformats.org/officeDocument/2006/relationships" xmlns:p="http://schemas.openxmlformats.org/presentationml/2006/main">
   <p:cSld>
     <p:spTree>
@@ -26010,7 +25960,7 @@
 </p:sld>
 </file>
 
-<file path=ppt/slides/slide34.xml><?xml version="1.0" encoding="utf-8"?>
+<file path=ppt/slides/slide33.xml><?xml version="1.0" encoding="utf-8"?>
 <p:sld xmlns:a="http://schemas.openxmlformats.org/drawingml/2006/main" xmlns:r="http://schemas.openxmlformats.org/officeDocument/2006/relationships" xmlns:p="http://schemas.openxmlformats.org/presentationml/2006/main">
   <p:cSld>
     <p:spTree>
@@ -26453,7 +26403,7 @@
 </p:sld>
 </file>
 
-<file path=ppt/slides/slide35.xml><?xml version="1.0" encoding="utf-8"?>
+<file path=ppt/slides/slide34.xml><?xml version="1.0" encoding="utf-8"?>
 <p:sld xmlns:a="http://schemas.openxmlformats.org/drawingml/2006/main" xmlns:r="http://schemas.openxmlformats.org/officeDocument/2006/relationships" xmlns:p="http://schemas.openxmlformats.org/presentationml/2006/main">
   <p:cSld>
     <p:spTree>
@@ -26956,7 +26906,7 @@
 </p:sld>
 </file>
 
-<file path=ppt/slides/slide36.xml><?xml version="1.0" encoding="utf-8"?>
+<file path=ppt/slides/slide35.xml><?xml version="1.0" encoding="utf-8"?>
 <p:sld xmlns:a="http://schemas.openxmlformats.org/drawingml/2006/main" xmlns:r="http://schemas.openxmlformats.org/officeDocument/2006/relationships" xmlns:p="http://schemas.openxmlformats.org/presentationml/2006/main">
   <p:cSld>
     <p:spTree>
@@ -27713,7 +27663,7 @@
 </p:sld>
 </file>
 
-<file path=ppt/slides/slide37.xml><?xml version="1.0" encoding="utf-8"?>
+<file path=ppt/slides/slide36.xml><?xml version="1.0" encoding="utf-8"?>
 <p:sld xmlns:a="http://schemas.openxmlformats.org/drawingml/2006/main" xmlns:r="http://schemas.openxmlformats.org/officeDocument/2006/relationships" xmlns:p="http://schemas.openxmlformats.org/presentationml/2006/main">
   <p:cSld>
     <p:spTree>
@@ -28612,7 +28562,7 @@
 </p:sld>
 </file>
 
-<file path=ppt/slides/slide38.xml><?xml version="1.0" encoding="utf-8"?>
+<file path=ppt/slides/slide37.xml><?xml version="1.0" encoding="utf-8"?>
 <p:sld xmlns:a="http://schemas.openxmlformats.org/drawingml/2006/main" xmlns:r="http://schemas.openxmlformats.org/officeDocument/2006/relationships" xmlns:p="http://schemas.openxmlformats.org/presentationml/2006/main">
   <p:cSld>
     <p:spTree>
@@ -29175,7 +29125,7 @@
 </p:sld>
 </file>
 
-<file path=ppt/slides/slide39.xml><?xml version="1.0" encoding="utf-8"?>
+<file path=ppt/slides/slide38.xml><?xml version="1.0" encoding="utf-8"?>
 <p:sld xmlns:a="http://schemas.openxmlformats.org/drawingml/2006/main" xmlns:r="http://schemas.openxmlformats.org/officeDocument/2006/relationships" xmlns:p="http://schemas.openxmlformats.org/presentationml/2006/main">
   <p:cSld>
     <p:spTree>
@@ -29298,119 +29248,7 @@
 </p:sld>
 </file>
 
-<file path=ppt/slides/slide4.xml><?xml version="1.0" encoding="utf-8"?>
-<p:sld xmlns:a="http://schemas.openxmlformats.org/drawingml/2006/main" xmlns:r="http://schemas.openxmlformats.org/officeDocument/2006/relationships" xmlns:p="http://schemas.openxmlformats.org/presentationml/2006/main">
-  <p:cSld>
-    <p:spTree>
-      <p:nvGrpSpPr>
-        <p:cNvPr id="1" name=""/>
-        <p:cNvGrpSpPr/>
-        <p:nvPr/>
-      </p:nvGrpSpPr>
-      <p:grpSpPr>
-        <a:xfrm>
-          <a:off x="0" y="0"/>
-          <a:ext cx="0" cy="0"/>
-          <a:chOff x="0" y="0"/>
-          <a:chExt cx="0" cy="0"/>
-        </a:xfrm>
-      </p:grpSpPr>
-      <p:sp>
-        <p:nvSpPr>
-          <p:cNvPr id="2" name="Title 1">
-            <a:extLst>
-              <a:ext uri="{FF2B5EF4-FFF2-40B4-BE49-F238E27FC236}">
-                <a16:creationId xmlns:a16="http://schemas.microsoft.com/office/drawing/2014/main" id="{740B9B10-8093-4608-BB45-91056BC899E5}"/>
-              </a:ext>
-            </a:extLst>
-          </p:cNvPr>
-          <p:cNvSpPr>
-            <a:spLocks noGrp="1"/>
-          </p:cNvSpPr>
-          <p:nvPr>
-            <p:ph type="title"/>
-          </p:nvPr>
-        </p:nvSpPr>
-        <p:spPr/>
-        <p:txBody>
-          <a:bodyPr/>
-          <a:lstStyle/>
-          <a:p>
-            <a:r>
-              <a:rPr lang="en-US" dirty="0"/>
-              <a:t>AGENDA</a:t>
-            </a:r>
-          </a:p>
-        </p:txBody>
-      </p:sp>
-      <p:sp>
-        <p:nvSpPr>
-          <p:cNvPr id="3" name="Content Placeholder 2">
-            <a:extLst>
-              <a:ext uri="{FF2B5EF4-FFF2-40B4-BE49-F238E27FC236}">
-                <a16:creationId xmlns:a16="http://schemas.microsoft.com/office/drawing/2014/main" id="{E02C06E3-E34F-45B8-995C-15207D89B99F}"/>
-              </a:ext>
-            </a:extLst>
-          </p:cNvPr>
-          <p:cNvSpPr>
-            <a:spLocks noGrp="1"/>
-          </p:cNvSpPr>
-          <p:nvPr>
-            <p:ph idx="1"/>
-          </p:nvPr>
-        </p:nvSpPr>
-        <p:spPr/>
-        <p:txBody>
-          <a:bodyPr anchor="t">
-            <a:normAutofit/>
-          </a:bodyPr>
-          <a:lstStyle/>
-          <a:p>
-            <a:r>
-              <a:rPr lang="en-US" sz="2800" dirty="0"/>
-              <a:t>Why did I start studying algorithms?</a:t>
-            </a:r>
-          </a:p>
-          <a:p>
-            <a:r>
-              <a:rPr lang="en-US" sz="2800" dirty="0"/>
-              <a:t>What makes a hard problem hard?</a:t>
-            </a:r>
-          </a:p>
-          <a:p>
-            <a:r>
-              <a:rPr lang="en-US" sz="2800" dirty="0"/>
-              <a:t>Comparing solutions using “big O” notation</a:t>
-            </a:r>
-          </a:p>
-          <a:p>
-            <a:r>
-              <a:rPr lang="en-US" sz="2800" dirty="0"/>
-              <a:t>Sample problems</a:t>
-            </a:r>
-          </a:p>
-          <a:p>
-            <a:r>
-              <a:rPr lang="en-US" sz="2800" dirty="0"/>
-              <a:t>How to practice and get better</a:t>
-            </a:r>
-          </a:p>
-        </p:txBody>
-      </p:sp>
-    </p:spTree>
-    <p:extLst>
-      <p:ext uri="{BB962C8B-B14F-4D97-AF65-F5344CB8AC3E}">
-        <p14:creationId xmlns:p14="http://schemas.microsoft.com/office/powerpoint/2010/main" val="3751573683"/>
-      </p:ext>
-    </p:extLst>
-  </p:cSld>
-  <p:clrMapOvr>
-    <a:masterClrMapping/>
-  </p:clrMapOvr>
-</p:sld>
-</file>
-
-<file path=ppt/slides/slide40.xml><?xml version="1.0" encoding="utf-8"?>
+<file path=ppt/slides/slide39.xml><?xml version="1.0" encoding="utf-8"?>
 <p:sld xmlns:a="http://schemas.openxmlformats.org/drawingml/2006/main" xmlns:r="http://schemas.openxmlformats.org/officeDocument/2006/relationships" xmlns:p="http://schemas.openxmlformats.org/presentationml/2006/main">
   <p:cSld>
     <p:spTree>
@@ -31149,7 +30987,120 @@
 </p:sld>
 </file>
 
-<file path=ppt/slides/slide41.xml><?xml version="1.0" encoding="utf-8"?>
+<file path=ppt/slides/slide4.xml><?xml version="1.0" encoding="utf-8"?>
+<p:sld xmlns:a="http://schemas.openxmlformats.org/drawingml/2006/main" xmlns:r="http://schemas.openxmlformats.org/officeDocument/2006/relationships" xmlns:p="http://schemas.openxmlformats.org/presentationml/2006/main">
+  <p:cSld>
+    <p:spTree>
+      <p:nvGrpSpPr>
+        <p:cNvPr id="1" name=""/>
+        <p:cNvGrpSpPr/>
+        <p:nvPr/>
+      </p:nvGrpSpPr>
+      <p:grpSpPr>
+        <a:xfrm>
+          <a:off x="0" y="0"/>
+          <a:ext cx="0" cy="0"/>
+          <a:chOff x="0" y="0"/>
+          <a:chExt cx="0" cy="0"/>
+        </a:xfrm>
+      </p:grpSpPr>
+      <p:sp>
+        <p:nvSpPr>
+          <p:cNvPr id="2" name="Title 1">
+            <a:extLst>
+              <a:ext uri="{FF2B5EF4-FFF2-40B4-BE49-F238E27FC236}">
+                <a16:creationId xmlns:a16="http://schemas.microsoft.com/office/drawing/2014/main" id="{740B9B10-8093-4608-BB45-91056BC899E5}"/>
+              </a:ext>
+            </a:extLst>
+          </p:cNvPr>
+          <p:cNvSpPr>
+            <a:spLocks noGrp="1"/>
+          </p:cNvSpPr>
+          <p:nvPr>
+            <p:ph type="title"/>
+          </p:nvPr>
+        </p:nvSpPr>
+        <p:spPr/>
+        <p:txBody>
+          <a:bodyPr/>
+          <a:lstStyle/>
+          <a:p>
+            <a:r>
+              <a:rPr lang="en-US" dirty="0"/>
+              <a:t>Flashback to April 2020</a:t>
+            </a:r>
+          </a:p>
+        </p:txBody>
+      </p:sp>
+      <p:sp>
+        <p:nvSpPr>
+          <p:cNvPr id="3" name="Content Placeholder 2">
+            <a:extLst>
+              <a:ext uri="{FF2B5EF4-FFF2-40B4-BE49-F238E27FC236}">
+                <a16:creationId xmlns:a16="http://schemas.microsoft.com/office/drawing/2014/main" id="{E02C06E3-E34F-45B8-995C-15207D89B99F}"/>
+              </a:ext>
+            </a:extLst>
+          </p:cNvPr>
+          <p:cNvSpPr>
+            <a:spLocks noGrp="1"/>
+          </p:cNvSpPr>
+          <p:nvPr>
+            <p:ph idx="1"/>
+          </p:nvPr>
+        </p:nvSpPr>
+        <p:spPr/>
+        <p:txBody>
+          <a:bodyPr anchor="t">
+            <a:normAutofit/>
+          </a:bodyPr>
+          <a:lstStyle/>
+          <a:p>
+            <a:pPr marL="0" indent="0">
+              <a:buNone/>
+            </a:pPr>
+            <a:r>
+              <a:rPr lang="en-US" sz="2800" dirty="0"/>
+              <a:t>Four-week furlough from my client</a:t>
+            </a:r>
+          </a:p>
+          <a:p>
+            <a:pPr marL="0" indent="0">
+              <a:buNone/>
+            </a:pPr>
+            <a:r>
+              <a:rPr lang="en-US" sz="2800" dirty="0"/>
+              <a:t>To stay sharp… and to keep my mind off the news</a:t>
+            </a:r>
+          </a:p>
+          <a:p>
+            <a:pPr marL="0" indent="0">
+              <a:buNone/>
+            </a:pPr>
+            <a:r>
+              <a:rPr lang="en-US" sz="2800" dirty="0" err="1"/>
+              <a:t>LeetCode’s</a:t>
+            </a:r>
+            <a:r>
+              <a:rPr lang="en-US" sz="2800" dirty="0"/>
+              <a:t> daily programming challenges</a:t>
+            </a:r>
+          </a:p>
+        </p:txBody>
+      </p:sp>
+    </p:spTree>
+    <p:extLst>
+      <p:ext uri="{BB962C8B-B14F-4D97-AF65-F5344CB8AC3E}">
+        <p14:creationId xmlns:p14="http://schemas.microsoft.com/office/powerpoint/2010/main" val="143275861"/>
+      </p:ext>
+    </p:extLst>
+  </p:cSld>
+  <p:clrMapOvr>
+    <a:masterClrMapping/>
+  </p:clrMapOvr>
+</p:sld>
+</file>
+
+<file path=ppt/slides/slide40.xml><?xml version="1.0" encoding="utf-8"?>
 <p:sld xmlns:a="http://schemas.openxmlformats.org/drawingml/2006/main" xmlns:r="http://schemas.openxmlformats.org/officeDocument/2006/relationships" xmlns:p="http://schemas.openxmlformats.org/presentationml/2006/main">
   <p:cSld>
     <p:spTree>
@@ -32777,7 +32728,7 @@
 </p:sld>
 </file>
 
-<file path=ppt/slides/slide42.xml><?xml version="1.0" encoding="utf-8"?>
+<file path=ppt/slides/slide41.xml><?xml version="1.0" encoding="utf-8"?>
 <p:sld xmlns:a="http://schemas.openxmlformats.org/drawingml/2006/main" xmlns:r="http://schemas.openxmlformats.org/officeDocument/2006/relationships" xmlns:p="http://schemas.openxmlformats.org/presentationml/2006/main">
   <p:cSld>
     <p:spTree>
@@ -34584,7 +34535,7 @@
 </p:sld>
 </file>
 
-<file path=ppt/slides/slide43.xml><?xml version="1.0" encoding="utf-8"?>
+<file path=ppt/slides/slide42.xml><?xml version="1.0" encoding="utf-8"?>
 <p:sld xmlns:a="http://schemas.openxmlformats.org/drawingml/2006/main" xmlns:r="http://schemas.openxmlformats.org/officeDocument/2006/relationships" xmlns:p="http://schemas.openxmlformats.org/presentationml/2006/main">
   <p:cSld>
     <p:spTree>
@@ -35400,7 +35351,7 @@
 </p:sld>
 </file>
 
-<file path=ppt/slides/slide44.xml><?xml version="1.0" encoding="utf-8"?>
+<file path=ppt/slides/slide43.xml><?xml version="1.0" encoding="utf-8"?>
 <p:sld xmlns:a="http://schemas.openxmlformats.org/drawingml/2006/main" xmlns:r="http://schemas.openxmlformats.org/officeDocument/2006/relationships" xmlns:p="http://schemas.openxmlformats.org/presentationml/2006/main">
   <p:cSld>
     <p:spTree>
@@ -36133,6 +36084,200 @@
 </p:sld>
 </file>
 
+<file path=ppt/slides/slide44.xml><?xml version="1.0" encoding="utf-8"?>
+<p:sld xmlns:a="http://schemas.openxmlformats.org/drawingml/2006/main" xmlns:r="http://schemas.openxmlformats.org/officeDocument/2006/relationships" xmlns:p="http://schemas.openxmlformats.org/presentationml/2006/main">
+  <p:cSld>
+    <p:spTree>
+      <p:nvGrpSpPr>
+        <p:cNvPr id="1" name=""/>
+        <p:cNvGrpSpPr/>
+        <p:nvPr/>
+      </p:nvGrpSpPr>
+      <p:grpSpPr>
+        <a:xfrm>
+          <a:off x="0" y="0"/>
+          <a:ext cx="0" cy="0"/>
+          <a:chOff x="0" y="0"/>
+          <a:chExt cx="0" cy="0"/>
+        </a:xfrm>
+      </p:grpSpPr>
+      <p:sp>
+        <p:nvSpPr>
+          <p:cNvPr id="2" name="Title 1">
+            <a:extLst>
+              <a:ext uri="{FF2B5EF4-FFF2-40B4-BE49-F238E27FC236}">
+                <a16:creationId xmlns:a16="http://schemas.microsoft.com/office/drawing/2014/main" id="{811B27AE-23B4-4897-8D2F-709050B5C45B}"/>
+              </a:ext>
+            </a:extLst>
+          </p:cNvPr>
+          <p:cNvSpPr>
+            <a:spLocks noGrp="1"/>
+          </p:cNvSpPr>
+          <p:nvPr>
+            <p:ph type="title"/>
+          </p:nvPr>
+        </p:nvSpPr>
+        <p:spPr/>
+        <p:txBody>
+          <a:bodyPr anchor="t"/>
+          <a:lstStyle/>
+          <a:p>
+            <a:r>
+              <a:rPr lang="en-US" dirty="0"/>
+              <a:t>Subgraph size: Construct Graph and BFS/DFS</a:t>
+            </a:r>
+          </a:p>
+        </p:txBody>
+      </p:sp>
+      <p:sp>
+        <p:nvSpPr>
+          <p:cNvPr id="3" name="Content Placeholder 2">
+            <a:extLst>
+              <a:ext uri="{FF2B5EF4-FFF2-40B4-BE49-F238E27FC236}">
+                <a16:creationId xmlns:a16="http://schemas.microsoft.com/office/drawing/2014/main" id="{28199AAA-01AF-4551-B410-CA2297F85B28}"/>
+              </a:ext>
+            </a:extLst>
+          </p:cNvPr>
+          <p:cNvSpPr>
+            <a:spLocks noGrp="1"/>
+          </p:cNvSpPr>
+          <p:nvPr>
+            <p:ph idx="1"/>
+          </p:nvPr>
+        </p:nvSpPr>
+        <p:spPr>
+          <a:xfrm>
+            <a:off x="685801" y="1337733"/>
+            <a:ext cx="11000935" cy="5029835"/>
+          </a:xfrm>
+        </p:spPr>
+        <p:txBody>
+          <a:bodyPr anchor="t">
+            <a:noAutofit/>
+          </a:bodyPr>
+          <a:lstStyle/>
+          <a:p>
+            <a:r>
+              <a:rPr lang="en-US" sz="2800" dirty="0"/>
+              <a:t>Construct the graph in memory, e.g. in a Map&lt;</a:t>
+            </a:r>
+            <a:r>
+              <a:rPr lang="en-US" sz="2800" dirty="0" err="1"/>
+              <a:t>Integer,List</a:t>
+            </a:r>
+            <a:r>
+              <a:rPr lang="en-US" sz="2800" dirty="0"/>
+              <a:t>&lt;Integer&gt;&gt;</a:t>
+            </a:r>
+          </a:p>
+          <a:p>
+            <a:r>
+              <a:rPr lang="en-US" sz="2800" dirty="0"/>
+              <a:t>Choose an integer, and find all other “connected” integers</a:t>
+            </a:r>
+          </a:p>
+          <a:p>
+            <a:r>
+              <a:rPr lang="en-US" sz="2800" dirty="0"/>
+              <a:t>Find all integers that are connected to those integers, and so on</a:t>
+            </a:r>
+          </a:p>
+          <a:p>
+            <a:pPr lvl="1">
+              <a:buFont typeface="Wingdings" panose="05000000000000000000" pitchFamily="2" charset="2"/>
+              <a:buChar char="Ø"/>
+            </a:pPr>
+            <a:r>
+              <a:rPr lang="en-US" sz="2800" dirty="0"/>
+              <a:t> “Breadth-first search”, or BFS</a:t>
+            </a:r>
+          </a:p>
+          <a:p>
+            <a:pPr lvl="1">
+              <a:buFont typeface="Wingdings" panose="05000000000000000000" pitchFamily="2" charset="2"/>
+              <a:buChar char="Ø"/>
+            </a:pPr>
+            <a:r>
+              <a:rPr lang="en-US" sz="2800" dirty="0"/>
+              <a:t> “Depth-first search”, or DFS</a:t>
+            </a:r>
+          </a:p>
+          <a:p>
+            <a:r>
+              <a:rPr lang="en-US" sz="2800" dirty="0"/>
+              <a:t>Merge lists, keep track of max list size, return max size at the end</a:t>
+            </a:r>
+          </a:p>
+          <a:p>
+            <a:pPr marL="0" indent="0">
+              <a:spcBef>
+                <a:spcPts val="1200"/>
+              </a:spcBef>
+              <a:buNone/>
+            </a:pPr>
+            <a:r>
+              <a:rPr lang="en-US" sz="2800" dirty="0"/>
+              <a:t>Time complexity: O(n</a:t>
+            </a:r>
+            <a:r>
+              <a:rPr lang="en-US" sz="2800" baseline="30000" dirty="0"/>
+              <a:t>2</a:t>
+            </a:r>
+            <a:r>
+              <a:rPr lang="en-US" sz="2800" dirty="0"/>
+              <a:t> log n)  (worst case: not connected at all)</a:t>
+            </a:r>
+          </a:p>
+          <a:p>
+            <a:pPr lvl="1">
+              <a:buFont typeface="Wingdings" panose="05000000000000000000" pitchFamily="2" charset="2"/>
+              <a:buChar char="Ø"/>
+            </a:pPr>
+            <a:r>
+              <a:rPr lang="en-US" sz="2800" dirty="0"/>
+              <a:t> Calculating GCD is O(log n), repeated O(n</a:t>
+            </a:r>
+            <a:r>
+              <a:rPr lang="en-US" sz="2800" baseline="30000" dirty="0"/>
+              <a:t>2</a:t>
+            </a:r>
+            <a:r>
+              <a:rPr lang="en-US" sz="2800" dirty="0"/>
+              <a:t>) times</a:t>
+            </a:r>
+          </a:p>
+          <a:p>
+            <a:pPr marL="0" indent="0">
+              <a:buNone/>
+            </a:pPr>
+            <a:r>
+              <a:rPr lang="en-US" sz="2800" dirty="0"/>
+              <a:t>Space complexity: O(n</a:t>
+            </a:r>
+            <a:r>
+              <a:rPr lang="en-US" sz="2800" baseline="30000" dirty="0"/>
+              <a:t>2</a:t>
+            </a:r>
+            <a:r>
+              <a:rPr lang="en-US" sz="2800" dirty="0"/>
+              <a:t>) for the Map (worst case: fully connected)</a:t>
+            </a:r>
+          </a:p>
+        </p:txBody>
+      </p:sp>
+    </p:spTree>
+    <p:extLst>
+      <p:ext uri="{BB962C8B-B14F-4D97-AF65-F5344CB8AC3E}">
+        <p14:creationId xmlns:p14="http://schemas.microsoft.com/office/powerpoint/2010/main" val="1287247791"/>
+      </p:ext>
+    </p:extLst>
+  </p:cSld>
+  <p:clrMapOvr>
+    <a:masterClrMapping/>
+  </p:clrMapOvr>
+</p:sld>
+</file>
+
 <file path=ppt/slides/slide45.xml><?xml version="1.0" encoding="utf-8"?>
 <p:sld xmlns:a="http://schemas.openxmlformats.org/drawingml/2006/main" xmlns:r="http://schemas.openxmlformats.org/officeDocument/2006/relationships" xmlns:p="http://schemas.openxmlformats.org/presentationml/2006/main">
   <p:cSld>
@@ -36173,200 +36318,6 @@
           <a:p>
             <a:r>
               <a:rPr lang="en-US" dirty="0"/>
-              <a:t>Subgraph size: Construct Graph and BFS/DFS</a:t>
-            </a:r>
-          </a:p>
-        </p:txBody>
-      </p:sp>
-      <p:sp>
-        <p:nvSpPr>
-          <p:cNvPr id="3" name="Content Placeholder 2">
-            <a:extLst>
-              <a:ext uri="{FF2B5EF4-FFF2-40B4-BE49-F238E27FC236}">
-                <a16:creationId xmlns:a16="http://schemas.microsoft.com/office/drawing/2014/main" id="{28199AAA-01AF-4551-B410-CA2297F85B28}"/>
-              </a:ext>
-            </a:extLst>
-          </p:cNvPr>
-          <p:cNvSpPr>
-            <a:spLocks noGrp="1"/>
-          </p:cNvSpPr>
-          <p:nvPr>
-            <p:ph idx="1"/>
-          </p:nvPr>
-        </p:nvSpPr>
-        <p:spPr>
-          <a:xfrm>
-            <a:off x="685801" y="1337733"/>
-            <a:ext cx="11000935" cy="5029835"/>
-          </a:xfrm>
-        </p:spPr>
-        <p:txBody>
-          <a:bodyPr anchor="t">
-            <a:noAutofit/>
-          </a:bodyPr>
-          <a:lstStyle/>
-          <a:p>
-            <a:r>
-              <a:rPr lang="en-US" sz="2800" dirty="0"/>
-              <a:t>Construct the graph in memory, e.g. in a Map&lt;</a:t>
-            </a:r>
-            <a:r>
-              <a:rPr lang="en-US" sz="2800" dirty="0" err="1"/>
-              <a:t>Integer,List</a:t>
-            </a:r>
-            <a:r>
-              <a:rPr lang="en-US" sz="2800" dirty="0"/>
-              <a:t>&lt;Integer&gt;&gt;</a:t>
-            </a:r>
-          </a:p>
-          <a:p>
-            <a:r>
-              <a:rPr lang="en-US" sz="2800" dirty="0"/>
-              <a:t>Choose an integer, and find all other “connected” integers</a:t>
-            </a:r>
-          </a:p>
-          <a:p>
-            <a:r>
-              <a:rPr lang="en-US" sz="2800" dirty="0"/>
-              <a:t>Find all integers that are connected to those integers, and so on</a:t>
-            </a:r>
-          </a:p>
-          <a:p>
-            <a:pPr lvl="1">
-              <a:buFont typeface="Wingdings" panose="05000000000000000000" pitchFamily="2" charset="2"/>
-              <a:buChar char="Ø"/>
-            </a:pPr>
-            <a:r>
-              <a:rPr lang="en-US" sz="2800" dirty="0"/>
-              <a:t> “Breadth-first search”, or BFS</a:t>
-            </a:r>
-          </a:p>
-          <a:p>
-            <a:pPr lvl="1">
-              <a:buFont typeface="Wingdings" panose="05000000000000000000" pitchFamily="2" charset="2"/>
-              <a:buChar char="Ø"/>
-            </a:pPr>
-            <a:r>
-              <a:rPr lang="en-US" sz="2800" dirty="0"/>
-              <a:t> “Depth-first search”, or DFS</a:t>
-            </a:r>
-          </a:p>
-          <a:p>
-            <a:r>
-              <a:rPr lang="en-US" sz="2800" dirty="0"/>
-              <a:t>Merge lists, keep track of max list size, return max size at the end</a:t>
-            </a:r>
-          </a:p>
-          <a:p>
-            <a:pPr marL="0" indent="0">
-              <a:spcBef>
-                <a:spcPts val="1200"/>
-              </a:spcBef>
-              <a:buNone/>
-            </a:pPr>
-            <a:r>
-              <a:rPr lang="en-US" sz="2800" dirty="0"/>
-              <a:t>Time complexity: O(n</a:t>
-            </a:r>
-            <a:r>
-              <a:rPr lang="en-US" sz="2800" baseline="30000" dirty="0"/>
-              <a:t>2</a:t>
-            </a:r>
-            <a:r>
-              <a:rPr lang="en-US" sz="2800" dirty="0"/>
-              <a:t> log n)  (worst case: not connected at all)</a:t>
-            </a:r>
-          </a:p>
-          <a:p>
-            <a:pPr lvl="1">
-              <a:buFont typeface="Wingdings" panose="05000000000000000000" pitchFamily="2" charset="2"/>
-              <a:buChar char="Ø"/>
-            </a:pPr>
-            <a:r>
-              <a:rPr lang="en-US" sz="2800" dirty="0"/>
-              <a:t> Calculating GCD is O(log n), repeated O(n</a:t>
-            </a:r>
-            <a:r>
-              <a:rPr lang="en-US" sz="2800" baseline="30000" dirty="0"/>
-              <a:t>2</a:t>
-            </a:r>
-            <a:r>
-              <a:rPr lang="en-US" sz="2800" dirty="0"/>
-              <a:t>) times</a:t>
-            </a:r>
-          </a:p>
-          <a:p>
-            <a:pPr marL="0" indent="0">
-              <a:buNone/>
-            </a:pPr>
-            <a:r>
-              <a:rPr lang="en-US" sz="2800" dirty="0"/>
-              <a:t>Space complexity: O(n</a:t>
-            </a:r>
-            <a:r>
-              <a:rPr lang="en-US" sz="2800" baseline="30000" dirty="0"/>
-              <a:t>2</a:t>
-            </a:r>
-            <a:r>
-              <a:rPr lang="en-US" sz="2800" dirty="0"/>
-              <a:t>) for the Map (worst case: fully connected)</a:t>
-            </a:r>
-          </a:p>
-        </p:txBody>
-      </p:sp>
-    </p:spTree>
-    <p:extLst>
-      <p:ext uri="{BB962C8B-B14F-4D97-AF65-F5344CB8AC3E}">
-        <p14:creationId xmlns:p14="http://schemas.microsoft.com/office/powerpoint/2010/main" val="1287247791"/>
-      </p:ext>
-    </p:extLst>
-  </p:cSld>
-  <p:clrMapOvr>
-    <a:masterClrMapping/>
-  </p:clrMapOvr>
-</p:sld>
-</file>
-
-<file path=ppt/slides/slide46.xml><?xml version="1.0" encoding="utf-8"?>
-<p:sld xmlns:a="http://schemas.openxmlformats.org/drawingml/2006/main" xmlns:r="http://schemas.openxmlformats.org/officeDocument/2006/relationships" xmlns:p="http://schemas.openxmlformats.org/presentationml/2006/main">
-  <p:cSld>
-    <p:spTree>
-      <p:nvGrpSpPr>
-        <p:cNvPr id="1" name=""/>
-        <p:cNvGrpSpPr/>
-        <p:nvPr/>
-      </p:nvGrpSpPr>
-      <p:grpSpPr>
-        <a:xfrm>
-          <a:off x="0" y="0"/>
-          <a:ext cx="0" cy="0"/>
-          <a:chOff x="0" y="0"/>
-          <a:chExt cx="0" cy="0"/>
-        </a:xfrm>
-      </p:grpSpPr>
-      <p:sp>
-        <p:nvSpPr>
-          <p:cNvPr id="2" name="Title 1">
-            <a:extLst>
-              <a:ext uri="{FF2B5EF4-FFF2-40B4-BE49-F238E27FC236}">
-                <a16:creationId xmlns:a16="http://schemas.microsoft.com/office/drawing/2014/main" id="{811B27AE-23B4-4897-8D2F-709050B5C45B}"/>
-              </a:ext>
-            </a:extLst>
-          </p:cNvPr>
-          <p:cNvSpPr>
-            <a:spLocks noGrp="1"/>
-          </p:cNvSpPr>
-          <p:nvPr>
-            <p:ph type="title"/>
-          </p:nvPr>
-        </p:nvSpPr>
-        <p:spPr/>
-        <p:txBody>
-          <a:bodyPr anchor="t"/>
-          <a:lstStyle/>
-          <a:p>
-            <a:r>
-              <a:rPr lang="en-US" dirty="0"/>
               <a:t>Subgraph size</a:t>
             </a:r>
           </a:p>
@@ -36462,7 +36413,7 @@
 </p:sld>
 </file>
 
-<file path=ppt/slides/slide47.xml><?xml version="1.0" encoding="utf-8"?>
+<file path=ppt/slides/slide46.xml><?xml version="1.0" encoding="utf-8"?>
 <p:sld xmlns:a="http://schemas.openxmlformats.org/drawingml/2006/main" xmlns:r="http://schemas.openxmlformats.org/officeDocument/2006/relationships" xmlns:p="http://schemas.openxmlformats.org/presentationml/2006/main">
   <p:cSld>
     <p:spTree>
@@ -37514,7 +37465,7 @@
 </p:sld>
 </file>
 
-<file path=ppt/slides/slide48.xml><?xml version="1.0" encoding="utf-8"?>
+<file path=ppt/slides/slide47.xml><?xml version="1.0" encoding="utf-8"?>
 <p:sld xmlns:a="http://schemas.openxmlformats.org/drawingml/2006/main" xmlns:r="http://schemas.openxmlformats.org/officeDocument/2006/relationships" xmlns:p="http://schemas.openxmlformats.org/presentationml/2006/main">
   <p:cSld>
     <p:spTree>
@@ -38414,7 +38365,7 @@
 </p:sld>
 </file>
 
-<file path=ppt/slides/slide49.xml><?xml version="1.0" encoding="utf-8"?>
+<file path=ppt/slides/slide48.xml><?xml version="1.0" encoding="utf-8"?>
 <p:sld xmlns:a="http://schemas.openxmlformats.org/drawingml/2006/main" xmlns:r="http://schemas.openxmlformats.org/officeDocument/2006/relationships" xmlns:p="http://schemas.openxmlformats.org/presentationml/2006/main">
   <p:cSld>
     <p:spTree>
@@ -38797,120 +38748,7 @@
 </p:sld>
 </file>
 
-<file path=ppt/slides/slide5.xml><?xml version="1.0" encoding="utf-8"?>
-<p:sld xmlns:a="http://schemas.openxmlformats.org/drawingml/2006/main" xmlns:r="http://schemas.openxmlformats.org/officeDocument/2006/relationships" xmlns:p="http://schemas.openxmlformats.org/presentationml/2006/main">
-  <p:cSld>
-    <p:spTree>
-      <p:nvGrpSpPr>
-        <p:cNvPr id="1" name=""/>
-        <p:cNvGrpSpPr/>
-        <p:nvPr/>
-      </p:nvGrpSpPr>
-      <p:grpSpPr>
-        <a:xfrm>
-          <a:off x="0" y="0"/>
-          <a:ext cx="0" cy="0"/>
-          <a:chOff x="0" y="0"/>
-          <a:chExt cx="0" cy="0"/>
-        </a:xfrm>
-      </p:grpSpPr>
-      <p:sp>
-        <p:nvSpPr>
-          <p:cNvPr id="2" name="Title 1">
-            <a:extLst>
-              <a:ext uri="{FF2B5EF4-FFF2-40B4-BE49-F238E27FC236}">
-                <a16:creationId xmlns:a16="http://schemas.microsoft.com/office/drawing/2014/main" id="{740B9B10-8093-4608-BB45-91056BC899E5}"/>
-              </a:ext>
-            </a:extLst>
-          </p:cNvPr>
-          <p:cNvSpPr>
-            <a:spLocks noGrp="1"/>
-          </p:cNvSpPr>
-          <p:nvPr>
-            <p:ph type="title"/>
-          </p:nvPr>
-        </p:nvSpPr>
-        <p:spPr/>
-        <p:txBody>
-          <a:bodyPr/>
-          <a:lstStyle/>
-          <a:p>
-            <a:r>
-              <a:rPr lang="en-US" dirty="0"/>
-              <a:t>Flashback to April 2020</a:t>
-            </a:r>
-          </a:p>
-        </p:txBody>
-      </p:sp>
-      <p:sp>
-        <p:nvSpPr>
-          <p:cNvPr id="3" name="Content Placeholder 2">
-            <a:extLst>
-              <a:ext uri="{FF2B5EF4-FFF2-40B4-BE49-F238E27FC236}">
-                <a16:creationId xmlns:a16="http://schemas.microsoft.com/office/drawing/2014/main" id="{E02C06E3-E34F-45B8-995C-15207D89B99F}"/>
-              </a:ext>
-            </a:extLst>
-          </p:cNvPr>
-          <p:cNvSpPr>
-            <a:spLocks noGrp="1"/>
-          </p:cNvSpPr>
-          <p:nvPr>
-            <p:ph idx="1"/>
-          </p:nvPr>
-        </p:nvSpPr>
-        <p:spPr/>
-        <p:txBody>
-          <a:bodyPr anchor="t">
-            <a:normAutofit/>
-          </a:bodyPr>
-          <a:lstStyle/>
-          <a:p>
-            <a:pPr marL="0" indent="0">
-              <a:buNone/>
-            </a:pPr>
-            <a:r>
-              <a:rPr lang="en-US" sz="2800" dirty="0"/>
-              <a:t>Four-week furlough from my client</a:t>
-            </a:r>
-          </a:p>
-          <a:p>
-            <a:pPr marL="0" indent="0">
-              <a:buNone/>
-            </a:pPr>
-            <a:r>
-              <a:rPr lang="en-US" sz="2800" dirty="0"/>
-              <a:t>To stay sharp… and to keep my mind off the news</a:t>
-            </a:r>
-          </a:p>
-          <a:p>
-            <a:pPr marL="0" indent="0">
-              <a:buNone/>
-            </a:pPr>
-            <a:r>
-              <a:rPr lang="en-US" sz="2800" dirty="0" err="1"/>
-              <a:t>LeetCode’s</a:t>
-            </a:r>
-            <a:r>
-              <a:rPr lang="en-US" sz="2800" dirty="0"/>
-              <a:t> daily programming challenges</a:t>
-            </a:r>
-          </a:p>
-        </p:txBody>
-      </p:sp>
-    </p:spTree>
-    <p:extLst>
-      <p:ext uri="{BB962C8B-B14F-4D97-AF65-F5344CB8AC3E}">
-        <p14:creationId xmlns:p14="http://schemas.microsoft.com/office/powerpoint/2010/main" val="143275861"/>
-      </p:ext>
-    </p:extLst>
-  </p:cSld>
-  <p:clrMapOvr>
-    <a:masterClrMapping/>
-  </p:clrMapOvr>
-</p:sld>
-</file>
-
-<file path=ppt/slides/slide50.xml><?xml version="1.0" encoding="utf-8"?>
+<file path=ppt/slides/slide49.xml><?xml version="1.0" encoding="utf-8"?>
 <p:sld xmlns:a="http://schemas.openxmlformats.org/drawingml/2006/main" xmlns:r="http://schemas.openxmlformats.org/officeDocument/2006/relationships" xmlns:p="http://schemas.openxmlformats.org/presentationml/2006/main">
   <p:cSld>
     <p:spTree>
@@ -39188,7 +39026,155 @@
 </p:sld>
 </file>
 
-<file path=ppt/slides/slide51.xml><?xml version="1.0" encoding="utf-8"?>
+<file path=ppt/slides/slide5.xml><?xml version="1.0" encoding="utf-8"?>
+<p:sld xmlns:a="http://schemas.openxmlformats.org/drawingml/2006/main" xmlns:r="http://schemas.openxmlformats.org/officeDocument/2006/relationships" xmlns:p="http://schemas.openxmlformats.org/presentationml/2006/main">
+  <p:cSld>
+    <p:bg>
+      <p:bgPr>
+        <a:blipFill>
+          <a:blip r:embed="rId2"/>
+          <a:stretch/>
+        </a:blipFill>
+        <a:effectLst/>
+      </p:bgPr>
+    </p:bg>
+    <p:spTree>
+      <p:nvGrpSpPr>
+        <p:cNvPr id="1" name=""/>
+        <p:cNvGrpSpPr/>
+        <p:nvPr/>
+      </p:nvGrpSpPr>
+      <p:grpSpPr>
+        <a:xfrm>
+          <a:off x="0" y="0"/>
+          <a:ext cx="0" cy="0"/>
+          <a:chOff x="0" y="0"/>
+          <a:chExt cx="0" cy="0"/>
+        </a:xfrm>
+      </p:grpSpPr>
+      <p:sp>
+        <p:nvSpPr>
+          <p:cNvPr id="2" name="Title 1">
+            <a:extLst>
+              <a:ext uri="{FF2B5EF4-FFF2-40B4-BE49-F238E27FC236}">
+                <a16:creationId xmlns:a16="http://schemas.microsoft.com/office/drawing/2014/main" id="{46927625-70B1-40E8-ACC4-1FFE544055C0}"/>
+              </a:ext>
+            </a:extLst>
+          </p:cNvPr>
+          <p:cNvSpPr>
+            <a:spLocks noGrp="1"/>
+          </p:cNvSpPr>
+          <p:nvPr>
+            <p:ph type="title"/>
+          </p:nvPr>
+        </p:nvSpPr>
+        <p:spPr>
+          <a:xfrm>
+            <a:off x="323126" y="2702318"/>
+            <a:ext cx="3979205" cy="1453363"/>
+          </a:xfrm>
+        </p:spPr>
+        <p:txBody>
+          <a:bodyPr>
+            <a:normAutofit/>
+          </a:bodyPr>
+          <a:lstStyle/>
+          <a:p>
+            <a:r>
+              <a:rPr lang="en-US" dirty="0"/>
+              <a:t>AT FIRST</a:t>
+            </a:r>
+          </a:p>
+        </p:txBody>
+      </p:sp>
+      <p:pic>
+        <p:nvPicPr>
+          <p:cNvPr id="1026" name="Picture 2" descr="Farmers Insurance updated their cover... - Farmers Insurance">
+            <a:extLst>
+              <a:ext uri="{FF2B5EF4-FFF2-40B4-BE49-F238E27FC236}">
+                <a16:creationId xmlns:a16="http://schemas.microsoft.com/office/drawing/2014/main" id="{502A1100-B1A0-44BF-82A4-472450059D4C}"/>
+              </a:ext>
+            </a:extLst>
+          </p:cNvPr>
+          <p:cNvPicPr>
+            <a:picLocks noChangeAspect="1" noChangeArrowheads="1"/>
+          </p:cNvPicPr>
+          <p:nvPr/>
+        </p:nvPicPr>
+        <p:blipFill>
+          <a:blip r:embed="rId3">
+            <a:extLst>
+              <a:ext uri="{28A0092B-C50C-407E-A947-70E740481C1C}">
+                <a14:useLocalDpi xmlns:a14="http://schemas.microsoft.com/office/drawing/2010/main" val="0"/>
+              </a:ext>
+            </a:extLst>
+          </a:blip>
+          <a:stretch>
+            <a:fillRect/>
+          </a:stretch>
+        </p:blipFill>
+        <p:spPr bwMode="auto">
+          <a:xfrm>
+            <a:off x="2312729" y="704538"/>
+            <a:ext cx="9663302" cy="5411449"/>
+          </a:xfrm>
+          <a:prstGeom prst="roundRect">
+            <a:avLst>
+              <a:gd name="adj" fmla="val 4380"/>
+            </a:avLst>
+          </a:prstGeom>
+          <a:noFill/>
+          <a:ln w="50800" cap="sq" cmpd="dbl">
+            <a:gradFill flip="none" rotWithShape="1">
+              <a:gsLst>
+                <a:gs pos="0">
+                  <a:srgbClr val="FFFFFF"/>
+                </a:gs>
+                <a:gs pos="100000">
+                  <a:schemeClr val="tx1">
+                    <a:alpha val="0"/>
+                  </a:schemeClr>
+                </a:gs>
+              </a:gsLst>
+              <a:path path="circle">
+                <a:fillToRect l="50000" t="50000" r="50000" b="50000"/>
+              </a:path>
+              <a:tileRect/>
+            </a:gradFill>
+            <a:miter lim="800000"/>
+          </a:ln>
+          <a:effectLst>
+            <a:outerShdw blurRad="254000" algn="tl" rotWithShape="0">
+              <a:srgbClr val="000000">
+                <a:alpha val="43000"/>
+              </a:srgbClr>
+            </a:outerShdw>
+          </a:effectLst>
+          <a:extLst>
+            <a:ext uri="{909E8E84-426E-40DD-AFC4-6F175D3DCCD1}">
+              <a14:hiddenFill xmlns:a14="http://schemas.microsoft.com/office/drawing/2010/main">
+                <a:solidFill>
+                  <a:srgbClr val="FFFFFF"/>
+                </a:solidFill>
+              </a14:hiddenFill>
+            </a:ext>
+          </a:extLst>
+        </p:spPr>
+      </p:pic>
+    </p:spTree>
+    <p:extLst>
+      <p:ext uri="{BB962C8B-B14F-4D97-AF65-F5344CB8AC3E}">
+        <p14:creationId xmlns:p14="http://schemas.microsoft.com/office/powerpoint/2010/main" val="81027578"/>
+      </p:ext>
+    </p:extLst>
+  </p:cSld>
+  <p:clrMapOvr>
+    <a:masterClrMapping/>
+  </p:clrMapOvr>
+</p:sld>
+</file>
+
+<file path=ppt/slides/slide50.xml><?xml version="1.0" encoding="utf-8"?>
 <p:sld xmlns:a="http://schemas.openxmlformats.org/drawingml/2006/main" xmlns:r="http://schemas.openxmlformats.org/officeDocument/2006/relationships" xmlns:p="http://schemas.openxmlformats.org/presentationml/2006/main">
   <p:cSld>
     <p:spTree>
@@ -40020,7 +40006,7 @@
 </p:sld>
 </file>
 
-<file path=ppt/slides/slide52.xml><?xml version="1.0" encoding="utf-8"?>
+<file path=ppt/slides/slide51.xml><?xml version="1.0" encoding="utf-8"?>
 <p:sld xmlns:a="http://schemas.openxmlformats.org/drawingml/2006/main" xmlns:r="http://schemas.openxmlformats.org/officeDocument/2006/relationships" xmlns:p="http://schemas.openxmlformats.org/presentationml/2006/main">
   <p:cSld>
     <p:spTree>
@@ -40260,7 +40246,7 @@
 </p:sld>
 </file>
 
-<file path=ppt/slides/slide53.xml><?xml version="1.0" encoding="utf-8"?>
+<file path=ppt/slides/slide52.xml><?xml version="1.0" encoding="utf-8"?>
 <p:sld xmlns:a="http://schemas.openxmlformats.org/drawingml/2006/main" xmlns:r="http://schemas.openxmlformats.org/officeDocument/2006/relationships" xmlns:p="http://schemas.openxmlformats.org/presentationml/2006/main">
   <p:cSld>
     <p:spTree>
@@ -41237,6 +41223,168 @@
 </p:sld>
 </file>
 
+<file path=ppt/slides/slide53.xml><?xml version="1.0" encoding="utf-8"?>
+<p:sld xmlns:a="http://schemas.openxmlformats.org/drawingml/2006/main" xmlns:r="http://schemas.openxmlformats.org/officeDocument/2006/relationships" xmlns:p="http://schemas.openxmlformats.org/presentationml/2006/main">
+  <p:cSld>
+    <p:spTree>
+      <p:nvGrpSpPr>
+        <p:cNvPr id="1" name=""/>
+        <p:cNvGrpSpPr/>
+        <p:nvPr/>
+      </p:nvGrpSpPr>
+      <p:grpSpPr>
+        <a:xfrm>
+          <a:off x="0" y="0"/>
+          <a:ext cx="0" cy="0"/>
+          <a:chOff x="0" y="0"/>
+          <a:chExt cx="0" cy="0"/>
+        </a:xfrm>
+      </p:grpSpPr>
+      <p:sp>
+        <p:nvSpPr>
+          <p:cNvPr id="2" name="Title 1">
+            <a:extLst>
+              <a:ext uri="{FF2B5EF4-FFF2-40B4-BE49-F238E27FC236}">
+                <a16:creationId xmlns:a16="http://schemas.microsoft.com/office/drawing/2014/main" id="{7699C63A-2FE7-488E-BF88-CE1A36A16114}"/>
+              </a:ext>
+            </a:extLst>
+          </p:cNvPr>
+          <p:cNvSpPr>
+            <a:spLocks noGrp="1"/>
+          </p:cNvSpPr>
+          <p:nvPr>
+            <p:ph type="title"/>
+          </p:nvPr>
+        </p:nvSpPr>
+        <p:spPr/>
+        <p:txBody>
+          <a:bodyPr anchor="t"/>
+          <a:lstStyle/>
+          <a:p>
+            <a:r>
+              <a:rPr lang="en-US" dirty="0"/>
+              <a:t>summary</a:t>
+            </a:r>
+          </a:p>
+        </p:txBody>
+      </p:sp>
+      <p:sp>
+        <p:nvSpPr>
+          <p:cNvPr id="3" name="Content Placeholder 2">
+            <a:extLst>
+              <a:ext uri="{FF2B5EF4-FFF2-40B4-BE49-F238E27FC236}">
+                <a16:creationId xmlns:a16="http://schemas.microsoft.com/office/drawing/2014/main" id="{C3D28F3A-88E0-4823-A560-6BD450E9EA50}"/>
+              </a:ext>
+            </a:extLst>
+          </p:cNvPr>
+          <p:cNvSpPr>
+            <a:spLocks noGrp="1"/>
+          </p:cNvSpPr>
+          <p:nvPr>
+            <p:ph idx="1"/>
+          </p:nvPr>
+        </p:nvSpPr>
+        <p:spPr>
+          <a:xfrm>
+            <a:off x="685801" y="1604433"/>
+            <a:ext cx="10131425" cy="4751397"/>
+          </a:xfrm>
+        </p:spPr>
+        <p:txBody>
+          <a:bodyPr anchor="t">
+            <a:normAutofit/>
+          </a:bodyPr>
+          <a:lstStyle/>
+          <a:p>
+            <a:pPr marL="0" indent="0">
+              <a:buNone/>
+            </a:pPr>
+            <a:r>
+              <a:rPr lang="en-US" sz="2800" dirty="0"/>
+              <a:t>Many problems have multiple solutions</a:t>
+            </a:r>
+          </a:p>
+          <a:p>
+            <a:pPr marL="0" indent="0">
+              <a:buNone/>
+            </a:pPr>
+            <a:r>
+              <a:rPr lang="en-US" sz="2800" dirty="0"/>
+              <a:t>Most developers can think of at least one way to solve a problem</a:t>
+            </a:r>
+          </a:p>
+          <a:p>
+            <a:pPr lvl="1">
+              <a:buFont typeface="Wingdings" panose="05000000000000000000" pitchFamily="2" charset="2"/>
+              <a:buChar char="Ø"/>
+            </a:pPr>
+            <a:r>
+              <a:rPr lang="en-US" sz="2600" dirty="0"/>
+              <a:t> Our first instinct might not lead us to the best approach</a:t>
+            </a:r>
+          </a:p>
+          <a:p>
+            <a:pPr lvl="1">
+              <a:buFont typeface="Wingdings" panose="05000000000000000000" pitchFamily="2" charset="2"/>
+              <a:buChar char="Ø"/>
+            </a:pPr>
+            <a:r>
+              <a:rPr lang="en-US" sz="2600" dirty="0"/>
+              <a:t> We can always learn more approaches</a:t>
+            </a:r>
+            <a:endParaRPr lang="en-US" sz="2400" dirty="0"/>
+          </a:p>
+          <a:p>
+            <a:pPr marL="0" indent="0">
+              <a:buNone/>
+            </a:pPr>
+            <a:r>
+              <a:rPr lang="en-US" sz="2800" dirty="0"/>
+              <a:t>Use “big O” analysis to compare performance for each approach</a:t>
+            </a:r>
+          </a:p>
+          <a:p>
+            <a:pPr lvl="1">
+              <a:buFont typeface="Wingdings" panose="05000000000000000000" pitchFamily="2" charset="2"/>
+              <a:buChar char="Ø"/>
+            </a:pPr>
+            <a:r>
+              <a:rPr lang="en-US" sz="2600" dirty="0"/>
+              <a:t> Growth rates of runtime and space requirements</a:t>
+            </a:r>
+          </a:p>
+          <a:p>
+            <a:pPr marL="0" indent="0">
+              <a:buNone/>
+            </a:pPr>
+            <a:r>
+              <a:rPr lang="en-US" sz="2800" dirty="0"/>
+              <a:t>Ultimate goal:  Compare approaches </a:t>
+            </a:r>
+            <a:r>
+              <a:rPr lang="en-US" sz="2800" i="1" dirty="0"/>
+              <a:t>before</a:t>
+            </a:r>
+            <a:r>
+              <a:rPr lang="en-US" sz="2800" dirty="0"/>
+              <a:t> coding</a:t>
+            </a:r>
+          </a:p>
+        </p:txBody>
+      </p:sp>
+    </p:spTree>
+    <p:extLst>
+      <p:ext uri="{BB962C8B-B14F-4D97-AF65-F5344CB8AC3E}">
+        <p14:creationId xmlns:p14="http://schemas.microsoft.com/office/powerpoint/2010/main" val="1221872570"/>
+      </p:ext>
+    </p:extLst>
+  </p:cSld>
+  <p:clrMapOvr>
+    <a:masterClrMapping/>
+  </p:clrMapOvr>
+</p:sld>
+</file>
+
 <file path=ppt/slides/slide54.xml><?xml version="1.0" encoding="utf-8"?>
 <p:sld xmlns:a="http://schemas.openxmlformats.org/drawingml/2006/main" xmlns:r="http://schemas.openxmlformats.org/officeDocument/2006/relationships" xmlns:p="http://schemas.openxmlformats.org/presentationml/2006/main">
   <p:cSld>
@@ -41277,7 +41425,7 @@
           <a:p>
             <a:r>
               <a:rPr lang="en-US" dirty="0"/>
-              <a:t>summary</a:t>
+              <a:t>Putting Algorithms into Practice</a:t>
             </a:r>
           </a:p>
         </p:txBody>
@@ -41314,18 +41462,10 @@
               <a:buNone/>
             </a:pPr>
             <a:r>
-              <a:rPr lang="en-US" sz="2800" dirty="0"/>
-              <a:t>Many problems have multiple solutions</a:t>
-            </a:r>
-          </a:p>
-          <a:p>
-            <a:pPr marL="0" indent="0">
-              <a:buNone/>
-            </a:pPr>
-            <a:r>
-              <a:rPr lang="en-US" sz="2800" dirty="0"/>
-              <a:t>Most developers can think of at least one way to solve a problem</a:t>
-            </a:r>
+              <a:rPr lang="en-US" sz="2800" dirty="0" err="1"/>
+              <a:t>LeetCode</a:t>
+            </a:r>
+            <a:endParaRPr lang="en-US" sz="2800" dirty="0"/>
           </a:p>
           <a:p>
             <a:pPr lvl="1">
@@ -41334,7 +41474,7 @@
             </a:pPr>
             <a:r>
               <a:rPr lang="en-US" sz="2600" dirty="0"/>
-              <a:t> Our first instinct might not lead us to the best approach</a:t>
+              <a:t> Over 2,000 problems to work on, ranked Easy, Medium, Hard</a:t>
             </a:r>
           </a:p>
           <a:p>
@@ -41344,17 +41484,7 @@
             </a:pPr>
             <a:r>
               <a:rPr lang="en-US" sz="2600" dirty="0"/>
-              <a:t> We can always learn more approaches</a:t>
-            </a:r>
-            <a:endParaRPr lang="en-US" sz="2400" dirty="0"/>
-          </a:p>
-          <a:p>
-            <a:pPr marL="0" indent="0">
-              <a:buNone/>
-            </a:pPr>
-            <a:r>
-              <a:rPr lang="en-US" sz="2800" dirty="0"/>
-              <a:t>Use “big O” analysis to compare performance for each approach</a:t>
+              <a:t> Discussion forum for each problem</a:t>
             </a:r>
           </a:p>
           <a:p>
@@ -41364,7 +41494,7 @@
             </a:pPr>
             <a:r>
               <a:rPr lang="en-US" sz="2600" dirty="0"/>
-              <a:t> Growth rates of runtime and space requirements</a:t>
+              <a:t> Daily challenges, weekly contests</a:t>
             </a:r>
           </a:p>
           <a:p>
@@ -41373,7 +41503,36 @@
             </a:pPr>
             <a:r>
               <a:rPr lang="en-US" sz="2800" dirty="0"/>
-              <a:t>Ultimate goal:  Compare approaches </a:t>
+              <a:t>Some alternatives</a:t>
+            </a:r>
+          </a:p>
+          <a:p>
+            <a:pPr lvl="1">
+              <a:buFont typeface="Wingdings" panose="05000000000000000000" pitchFamily="2" charset="2"/>
+              <a:buChar char="Ø"/>
+            </a:pPr>
+            <a:r>
+              <a:rPr lang="en-US" sz="2600" dirty="0"/>
+              <a:t> AlgoExpert.io, Interview Kickstart (interview prep) - $$</a:t>
+            </a:r>
+          </a:p>
+          <a:p>
+            <a:pPr lvl="1">
+              <a:buFont typeface="Wingdings" panose="05000000000000000000" pitchFamily="2" charset="2"/>
+              <a:buChar char="Ø"/>
+            </a:pPr>
+            <a:r>
+              <a:rPr lang="en-US" sz="2600" dirty="0"/>
+              <a:t> Khan Academy</a:t>
+            </a:r>
+          </a:p>
+          <a:p>
+            <a:pPr marL="0" indent="0">
+              <a:buNone/>
+            </a:pPr>
+            <a:r>
+              <a:rPr lang="en-US" sz="2800" dirty="0"/>
+              <a:t>Better to learn </a:t>
             </a:r>
             <a:r>
               <a:rPr lang="en-US" sz="2800" i="1" dirty="0"/>
@@ -41381,7 +41540,7 @@
             </a:r>
             <a:r>
               <a:rPr lang="en-US" sz="2800" dirty="0"/>
-              <a:t> coding</a:t>
+              <a:t> you need to know!</a:t>
             </a:r>
           </a:p>
         </p:txBody>
@@ -41389,7 +41548,7 @@
     </p:spTree>
     <p:extLst>
       <p:ext uri="{BB962C8B-B14F-4D97-AF65-F5344CB8AC3E}">
-        <p14:creationId xmlns:p14="http://schemas.microsoft.com/office/powerpoint/2010/main" val="1221872570"/>
+        <p14:creationId xmlns:p14="http://schemas.microsoft.com/office/powerpoint/2010/main" val="2198715328"/>
       </p:ext>
     </p:extLst>
   </p:cSld>
@@ -41439,179 +41598,6 @@
           <a:p>
             <a:r>
               <a:rPr lang="en-US" dirty="0"/>
-              <a:t>Putting Algorithms into Practice</a:t>
-            </a:r>
-          </a:p>
-        </p:txBody>
-      </p:sp>
-      <p:sp>
-        <p:nvSpPr>
-          <p:cNvPr id="3" name="Content Placeholder 2">
-            <a:extLst>
-              <a:ext uri="{FF2B5EF4-FFF2-40B4-BE49-F238E27FC236}">
-                <a16:creationId xmlns:a16="http://schemas.microsoft.com/office/drawing/2014/main" id="{C3D28F3A-88E0-4823-A560-6BD450E9EA50}"/>
-              </a:ext>
-            </a:extLst>
-          </p:cNvPr>
-          <p:cNvSpPr>
-            <a:spLocks noGrp="1"/>
-          </p:cNvSpPr>
-          <p:nvPr>
-            <p:ph idx="1"/>
-          </p:nvPr>
-        </p:nvSpPr>
-        <p:spPr>
-          <a:xfrm>
-            <a:off x="685801" y="1604433"/>
-            <a:ext cx="10131425" cy="4751397"/>
-          </a:xfrm>
-        </p:spPr>
-        <p:txBody>
-          <a:bodyPr anchor="t">
-            <a:normAutofit/>
-          </a:bodyPr>
-          <a:lstStyle/>
-          <a:p>
-            <a:pPr marL="0" indent="0">
-              <a:buNone/>
-            </a:pPr>
-            <a:r>
-              <a:rPr lang="en-US" sz="2800" dirty="0" err="1"/>
-              <a:t>LeetCode</a:t>
-            </a:r>
-            <a:endParaRPr lang="en-US" sz="2800" dirty="0"/>
-          </a:p>
-          <a:p>
-            <a:pPr lvl="1">
-              <a:buFont typeface="Wingdings" panose="05000000000000000000" pitchFamily="2" charset="2"/>
-              <a:buChar char="Ø"/>
-            </a:pPr>
-            <a:r>
-              <a:rPr lang="en-US" sz="2600" dirty="0"/>
-              <a:t> Over 2,000 problems to work on, ranked Easy, Medium, Hard</a:t>
-            </a:r>
-          </a:p>
-          <a:p>
-            <a:pPr lvl="1">
-              <a:buFont typeface="Wingdings" panose="05000000000000000000" pitchFamily="2" charset="2"/>
-              <a:buChar char="Ø"/>
-            </a:pPr>
-            <a:r>
-              <a:rPr lang="en-US" sz="2600" dirty="0"/>
-              <a:t> Discussion forum for each problem</a:t>
-            </a:r>
-          </a:p>
-          <a:p>
-            <a:pPr lvl="1">
-              <a:buFont typeface="Wingdings" panose="05000000000000000000" pitchFamily="2" charset="2"/>
-              <a:buChar char="Ø"/>
-            </a:pPr>
-            <a:r>
-              <a:rPr lang="en-US" sz="2600" dirty="0"/>
-              <a:t> Daily challenges, weekly contests</a:t>
-            </a:r>
-          </a:p>
-          <a:p>
-            <a:pPr marL="0" indent="0">
-              <a:buNone/>
-            </a:pPr>
-            <a:r>
-              <a:rPr lang="en-US" sz="2800" dirty="0"/>
-              <a:t>Some alternatives</a:t>
-            </a:r>
-          </a:p>
-          <a:p>
-            <a:pPr lvl="1">
-              <a:buFont typeface="Wingdings" panose="05000000000000000000" pitchFamily="2" charset="2"/>
-              <a:buChar char="Ø"/>
-            </a:pPr>
-            <a:r>
-              <a:rPr lang="en-US" sz="2600" dirty="0"/>
-              <a:t> AlgoExpert.io, Interview Kickstart (interview prep) - $$</a:t>
-            </a:r>
-          </a:p>
-          <a:p>
-            <a:pPr lvl="1">
-              <a:buFont typeface="Wingdings" panose="05000000000000000000" pitchFamily="2" charset="2"/>
-              <a:buChar char="Ø"/>
-            </a:pPr>
-            <a:r>
-              <a:rPr lang="en-US" sz="2600" dirty="0"/>
-              <a:t> Khan Academy</a:t>
-            </a:r>
-          </a:p>
-          <a:p>
-            <a:pPr marL="0" indent="0">
-              <a:buNone/>
-            </a:pPr>
-            <a:r>
-              <a:rPr lang="en-US" sz="2800" dirty="0"/>
-              <a:t>Better to learn </a:t>
-            </a:r>
-            <a:r>
-              <a:rPr lang="en-US" sz="2800" i="1" dirty="0"/>
-              <a:t>before</a:t>
-            </a:r>
-            <a:r>
-              <a:rPr lang="en-US" sz="2800" dirty="0"/>
-              <a:t> you need to know!</a:t>
-            </a:r>
-          </a:p>
-        </p:txBody>
-      </p:sp>
-    </p:spTree>
-    <p:extLst>
-      <p:ext uri="{BB962C8B-B14F-4D97-AF65-F5344CB8AC3E}">
-        <p14:creationId xmlns:p14="http://schemas.microsoft.com/office/powerpoint/2010/main" val="2198715328"/>
-      </p:ext>
-    </p:extLst>
-  </p:cSld>
-  <p:clrMapOvr>
-    <a:masterClrMapping/>
-  </p:clrMapOvr>
-</p:sld>
-</file>
-
-<file path=ppt/slides/slide56.xml><?xml version="1.0" encoding="utf-8"?>
-<p:sld xmlns:a="http://schemas.openxmlformats.org/drawingml/2006/main" xmlns:r="http://schemas.openxmlformats.org/officeDocument/2006/relationships" xmlns:p="http://schemas.openxmlformats.org/presentationml/2006/main">
-  <p:cSld>
-    <p:spTree>
-      <p:nvGrpSpPr>
-        <p:cNvPr id="1" name=""/>
-        <p:cNvGrpSpPr/>
-        <p:nvPr/>
-      </p:nvGrpSpPr>
-      <p:grpSpPr>
-        <a:xfrm>
-          <a:off x="0" y="0"/>
-          <a:ext cx="0" cy="0"/>
-          <a:chOff x="0" y="0"/>
-          <a:chExt cx="0" cy="0"/>
-        </a:xfrm>
-      </p:grpSpPr>
-      <p:sp>
-        <p:nvSpPr>
-          <p:cNvPr id="2" name="Title 1">
-            <a:extLst>
-              <a:ext uri="{FF2B5EF4-FFF2-40B4-BE49-F238E27FC236}">
-                <a16:creationId xmlns:a16="http://schemas.microsoft.com/office/drawing/2014/main" id="{7699C63A-2FE7-488E-BF88-CE1A36A16114}"/>
-              </a:ext>
-            </a:extLst>
-          </p:cNvPr>
-          <p:cNvSpPr>
-            <a:spLocks noGrp="1"/>
-          </p:cNvSpPr>
-          <p:nvPr>
-            <p:ph type="title"/>
-          </p:nvPr>
-        </p:nvSpPr>
-        <p:spPr/>
-        <p:txBody>
-          <a:bodyPr anchor="t"/>
-          <a:lstStyle/>
-          <a:p>
-            <a:r>
-              <a:rPr lang="en-US" dirty="0"/>
               <a:t>Some final advice</a:t>
             </a:r>
           </a:p>
@@ -41753,7 +41739,7 @@
 </p:sld>
 </file>
 
-<file path=ppt/slides/slide57.xml><?xml version="1.0" encoding="utf-8"?>
+<file path=ppt/slides/slide56.xml><?xml version="1.0" encoding="utf-8"?>
 <p:sld xmlns:a="http://schemas.openxmlformats.org/drawingml/2006/main" xmlns:r="http://schemas.openxmlformats.org/officeDocument/2006/relationships" xmlns:p="http://schemas.openxmlformats.org/presentationml/2006/main">
   <p:cSld>
     <p:spTree>
@@ -42093,7 +42079,7 @@
 </p:sld>
 </file>
 
-<file path=ppt/slides/slide58.xml><?xml version="1.0" encoding="utf-8"?>
+<file path=ppt/slides/slide57.xml><?xml version="1.0" encoding="utf-8"?>
 <p:sld xmlns:a="http://schemas.openxmlformats.org/drawingml/2006/main" xmlns:r="http://schemas.openxmlformats.org/officeDocument/2006/relationships" xmlns:p="http://schemas.openxmlformats.org/presentationml/2006/main">
   <p:cSld>
     <p:spTree>
@@ -42436,154 +42422,6 @@
 <file path=ppt/slides/slide6.xml><?xml version="1.0" encoding="utf-8"?>
 <p:sld xmlns:a="http://schemas.openxmlformats.org/drawingml/2006/main" xmlns:r="http://schemas.openxmlformats.org/officeDocument/2006/relationships" xmlns:p="http://schemas.openxmlformats.org/presentationml/2006/main">
   <p:cSld>
-    <p:bg>
-      <p:bgPr>
-        <a:blipFill>
-          <a:blip r:embed="rId2"/>
-          <a:stretch/>
-        </a:blipFill>
-        <a:effectLst/>
-      </p:bgPr>
-    </p:bg>
-    <p:spTree>
-      <p:nvGrpSpPr>
-        <p:cNvPr id="1" name=""/>
-        <p:cNvGrpSpPr/>
-        <p:nvPr/>
-      </p:nvGrpSpPr>
-      <p:grpSpPr>
-        <a:xfrm>
-          <a:off x="0" y="0"/>
-          <a:ext cx="0" cy="0"/>
-          <a:chOff x="0" y="0"/>
-          <a:chExt cx="0" cy="0"/>
-        </a:xfrm>
-      </p:grpSpPr>
-      <p:sp>
-        <p:nvSpPr>
-          <p:cNvPr id="2" name="Title 1">
-            <a:extLst>
-              <a:ext uri="{FF2B5EF4-FFF2-40B4-BE49-F238E27FC236}">
-                <a16:creationId xmlns:a16="http://schemas.microsoft.com/office/drawing/2014/main" id="{46927625-70B1-40E8-ACC4-1FFE544055C0}"/>
-              </a:ext>
-            </a:extLst>
-          </p:cNvPr>
-          <p:cNvSpPr>
-            <a:spLocks noGrp="1"/>
-          </p:cNvSpPr>
-          <p:nvPr>
-            <p:ph type="title"/>
-          </p:nvPr>
-        </p:nvSpPr>
-        <p:spPr>
-          <a:xfrm>
-            <a:off x="323126" y="2702318"/>
-            <a:ext cx="3979205" cy="1453363"/>
-          </a:xfrm>
-        </p:spPr>
-        <p:txBody>
-          <a:bodyPr>
-            <a:normAutofit/>
-          </a:bodyPr>
-          <a:lstStyle/>
-          <a:p>
-            <a:r>
-              <a:rPr lang="en-US" dirty="0"/>
-              <a:t>AT FIRST</a:t>
-            </a:r>
-          </a:p>
-        </p:txBody>
-      </p:sp>
-      <p:pic>
-        <p:nvPicPr>
-          <p:cNvPr id="1026" name="Picture 2" descr="Farmers Insurance updated their cover... - Farmers Insurance">
-            <a:extLst>
-              <a:ext uri="{FF2B5EF4-FFF2-40B4-BE49-F238E27FC236}">
-                <a16:creationId xmlns:a16="http://schemas.microsoft.com/office/drawing/2014/main" id="{502A1100-B1A0-44BF-82A4-472450059D4C}"/>
-              </a:ext>
-            </a:extLst>
-          </p:cNvPr>
-          <p:cNvPicPr>
-            <a:picLocks noChangeAspect="1" noChangeArrowheads="1"/>
-          </p:cNvPicPr>
-          <p:nvPr/>
-        </p:nvPicPr>
-        <p:blipFill>
-          <a:blip r:embed="rId3">
-            <a:extLst>
-              <a:ext uri="{28A0092B-C50C-407E-A947-70E740481C1C}">
-                <a14:useLocalDpi xmlns:a14="http://schemas.microsoft.com/office/drawing/2010/main" val="0"/>
-              </a:ext>
-            </a:extLst>
-          </a:blip>
-          <a:stretch>
-            <a:fillRect/>
-          </a:stretch>
-        </p:blipFill>
-        <p:spPr bwMode="auto">
-          <a:xfrm>
-            <a:off x="2312729" y="704538"/>
-            <a:ext cx="9663302" cy="5411449"/>
-          </a:xfrm>
-          <a:prstGeom prst="roundRect">
-            <a:avLst>
-              <a:gd name="adj" fmla="val 4380"/>
-            </a:avLst>
-          </a:prstGeom>
-          <a:noFill/>
-          <a:ln w="50800" cap="sq" cmpd="dbl">
-            <a:gradFill flip="none" rotWithShape="1">
-              <a:gsLst>
-                <a:gs pos="0">
-                  <a:srgbClr val="FFFFFF"/>
-                </a:gs>
-                <a:gs pos="100000">
-                  <a:schemeClr val="tx1">
-                    <a:alpha val="0"/>
-                  </a:schemeClr>
-                </a:gs>
-              </a:gsLst>
-              <a:path path="circle">
-                <a:fillToRect l="50000" t="50000" r="50000" b="50000"/>
-              </a:path>
-              <a:tileRect/>
-            </a:gradFill>
-            <a:miter lim="800000"/>
-          </a:ln>
-          <a:effectLst>
-            <a:outerShdw blurRad="254000" algn="tl" rotWithShape="0">
-              <a:srgbClr val="000000">
-                <a:alpha val="43000"/>
-              </a:srgbClr>
-            </a:outerShdw>
-          </a:effectLst>
-          <a:extLst>
-            <a:ext uri="{909E8E84-426E-40DD-AFC4-6F175D3DCCD1}">
-              <a14:hiddenFill xmlns:a14="http://schemas.microsoft.com/office/drawing/2010/main">
-                <a:solidFill>
-                  <a:srgbClr val="FFFFFF"/>
-                </a:solidFill>
-              </a14:hiddenFill>
-            </a:ext>
-          </a:extLst>
-        </p:spPr>
-      </p:pic>
-    </p:spTree>
-    <p:extLst>
-      <p:ext uri="{BB962C8B-B14F-4D97-AF65-F5344CB8AC3E}">
-        <p14:creationId xmlns:p14="http://schemas.microsoft.com/office/powerpoint/2010/main" val="81027578"/>
-      </p:ext>
-    </p:extLst>
-  </p:cSld>
-  <p:clrMapOvr>
-    <a:masterClrMapping/>
-  </p:clrMapOvr>
-</p:sld>
-</file>
-
-<file path=ppt/slides/slide7.xml><?xml version="1.0" encoding="utf-8"?>
-<p:sld xmlns:a="http://schemas.openxmlformats.org/drawingml/2006/main" xmlns:r="http://schemas.openxmlformats.org/officeDocument/2006/relationships" xmlns:p="http://schemas.openxmlformats.org/presentationml/2006/main">
-  <p:cSld>
     <p:spTree>
       <p:nvGrpSpPr>
         <p:cNvPr id="1" name=""/>
@@ -42678,7 +42516,7 @@
 </p:sld>
 </file>
 
-<file path=ppt/slides/slide8.xml><?xml version="1.0" encoding="utf-8"?>
+<file path=ppt/slides/slide7.xml><?xml version="1.0" encoding="utf-8"?>
 <p:sld xmlns:a="http://schemas.openxmlformats.org/drawingml/2006/main" xmlns:r="http://schemas.openxmlformats.org/officeDocument/2006/relationships" xmlns:p="http://schemas.openxmlformats.org/presentationml/2006/main">
   <p:cSld>
     <p:spTree>
@@ -42802,7 +42640,7 @@
 </p:sld>
 </file>
 
-<file path=ppt/slides/slide9.xml><?xml version="1.0" encoding="utf-8"?>
+<file path=ppt/slides/slide8.xml><?xml version="1.0" encoding="utf-8"?>
 <p:sld xmlns:a="http://schemas.openxmlformats.org/drawingml/2006/main" xmlns:r="http://schemas.openxmlformats.org/officeDocument/2006/relationships" xmlns:p="http://schemas.openxmlformats.org/presentationml/2006/main">
   <p:cSld>
     <p:spTree>
@@ -42937,6 +42775,118 @@
     <p:extLst>
       <p:ext uri="{BB962C8B-B14F-4D97-AF65-F5344CB8AC3E}">
         <p14:creationId xmlns:p14="http://schemas.microsoft.com/office/powerpoint/2010/main" val="2766545823"/>
+      </p:ext>
+    </p:extLst>
+  </p:cSld>
+  <p:clrMapOvr>
+    <a:masterClrMapping/>
+  </p:clrMapOvr>
+</p:sld>
+</file>
+
+<file path=ppt/slides/slide9.xml><?xml version="1.0" encoding="utf-8"?>
+<p:sld xmlns:a="http://schemas.openxmlformats.org/drawingml/2006/main" xmlns:r="http://schemas.openxmlformats.org/officeDocument/2006/relationships" xmlns:p="http://schemas.openxmlformats.org/presentationml/2006/main">
+  <p:cSld>
+    <p:spTree>
+      <p:nvGrpSpPr>
+        <p:cNvPr id="1" name=""/>
+        <p:cNvGrpSpPr/>
+        <p:nvPr/>
+      </p:nvGrpSpPr>
+      <p:grpSpPr>
+        <a:xfrm>
+          <a:off x="0" y="0"/>
+          <a:ext cx="0" cy="0"/>
+          <a:chOff x="0" y="0"/>
+          <a:chExt cx="0" cy="0"/>
+        </a:xfrm>
+      </p:grpSpPr>
+      <p:sp>
+        <p:nvSpPr>
+          <p:cNvPr id="2" name="Title 1">
+            <a:extLst>
+              <a:ext uri="{FF2B5EF4-FFF2-40B4-BE49-F238E27FC236}">
+                <a16:creationId xmlns:a16="http://schemas.microsoft.com/office/drawing/2014/main" id="{1F36936C-B97A-4466-BED5-BCCAFAF06FB2}"/>
+              </a:ext>
+            </a:extLst>
+          </p:cNvPr>
+          <p:cNvSpPr>
+            <a:spLocks noGrp="1"/>
+          </p:cNvSpPr>
+          <p:nvPr>
+            <p:ph type="title"/>
+          </p:nvPr>
+        </p:nvSpPr>
+        <p:spPr>
+          <a:xfrm>
+            <a:off x="685801" y="609600"/>
+            <a:ext cx="10781674" cy="3842479"/>
+          </a:xfrm>
+        </p:spPr>
+        <p:txBody>
+          <a:bodyPr anchor="ctr">
+            <a:normAutofit/>
+          </a:bodyPr>
+          <a:lstStyle/>
+          <a:p>
+            <a:pPr algn="ctr"/>
+            <a:r>
+              <a:rPr lang="en-US" sz="5400" dirty="0"/>
+              <a:t>A quick “big O” primer</a:t>
+            </a:r>
+          </a:p>
+        </p:txBody>
+      </p:sp>
+      <p:sp>
+        <p:nvSpPr>
+          <p:cNvPr id="3" name="TextBox 2">
+            <a:extLst>
+              <a:ext uri="{FF2B5EF4-FFF2-40B4-BE49-F238E27FC236}">
+                <a16:creationId xmlns:a16="http://schemas.microsoft.com/office/drawing/2014/main" id="{E3716B82-8AE4-46EE-807F-F0D1A0551E69}"/>
+              </a:ext>
+            </a:extLst>
+          </p:cNvPr>
+          <p:cNvSpPr txBox="1"/>
+          <p:nvPr/>
+        </p:nvSpPr>
+        <p:spPr>
+          <a:xfrm>
+            <a:off x="5418717" y="3429000"/>
+            <a:ext cx="1354565" cy="1569660"/>
+          </a:xfrm>
+          <a:prstGeom prst="rect">
+            <a:avLst/>
+          </a:prstGeom>
+          <a:noFill/>
+        </p:spPr>
+        <p:txBody>
+          <a:bodyPr wrap="square" rtlCol="0" anchor="ctr">
+            <a:spAutoFit/>
+          </a:bodyPr>
+          <a:lstStyle/>
+          <a:p>
+            <a:pPr algn="ctr"/>
+            <a:r>
+              <a:rPr lang="en-US" sz="9600" dirty="0">
+                <a:effectLst>
+                  <a:outerShdw blurRad="50800" dist="50800" dir="7200000" algn="ctr" rotWithShape="0">
+                    <a:schemeClr val="tx1">
+                      <a:lumMod val="65000"/>
+                    </a:schemeClr>
+                  </a:outerShdw>
+                </a:effectLst>
+                <a:latin typeface="Times New Roman" panose="02020603050405020304" pitchFamily="18" charset="0"/>
+                <a:cs typeface="Times New Roman" panose="02020603050405020304" pitchFamily="18" charset="0"/>
+              </a:rPr>
+              <a:t>O</a:t>
+            </a:r>
+          </a:p>
+        </p:txBody>
+      </p:sp>
+    </p:spTree>
+    <p:extLst>
+      <p:ext uri="{BB962C8B-B14F-4D97-AF65-F5344CB8AC3E}">
+        <p14:creationId xmlns:p14="http://schemas.microsoft.com/office/powerpoint/2010/main" val="343561814"/>
       </p:ext>
     </p:extLst>
   </p:cSld>

</xml_diff>